<commit_message>
updated presentation, summary and plots
</commit_message>
<xml_diff>
--- a/WattpadPrez.pptx
+++ b/WattpadPrez.pptx
@@ -5,21 +5,22 @@
     <p:sldMasterId id="2147483772" r:id="rId1"/>
   </p:sldMasterIdLst>
   <p:notesMasterIdLst>
-    <p:notesMasterId r:id="rId14"/>
+    <p:notesMasterId r:id="rId15"/>
   </p:notesMasterIdLst>
   <p:sldIdLst>
     <p:sldId id="256" r:id="rId2"/>
-    <p:sldId id="257" r:id="rId3"/>
-    <p:sldId id="258" r:id="rId4"/>
-    <p:sldId id="259" r:id="rId5"/>
-    <p:sldId id="269" r:id="rId6"/>
-    <p:sldId id="266" r:id="rId7"/>
-    <p:sldId id="265" r:id="rId8"/>
-    <p:sldId id="267" r:id="rId9"/>
-    <p:sldId id="268" r:id="rId10"/>
-    <p:sldId id="261" r:id="rId11"/>
-    <p:sldId id="262" r:id="rId12"/>
-    <p:sldId id="263" r:id="rId13"/>
+    <p:sldId id="270" r:id="rId3"/>
+    <p:sldId id="257" r:id="rId4"/>
+    <p:sldId id="258" r:id="rId5"/>
+    <p:sldId id="259" r:id="rId6"/>
+    <p:sldId id="269" r:id="rId7"/>
+    <p:sldId id="271" r:id="rId8"/>
+    <p:sldId id="265" r:id="rId9"/>
+    <p:sldId id="267" r:id="rId10"/>
+    <p:sldId id="268" r:id="rId11"/>
+    <p:sldId id="261" r:id="rId12"/>
+    <p:sldId id="262" r:id="rId13"/>
+    <p:sldId id="263" r:id="rId14"/>
   </p:sldIdLst>
   <p:sldSz cx="9144000" cy="6858000" type="screen4x3"/>
   <p:notesSz cx="6858000" cy="9144000"/>
@@ -4104,10 +4105,24 @@
     <dgm:pt modelId="{BC0F5EF4-5ACA-46D5-AFCB-987C25F78BC0}" type="parTrans" cxnId="{E05EE59C-7694-4C2B-A598-EAA30A0F4D4E}">
       <dgm:prSet/>
       <dgm:spPr/>
+      <dgm:t>
+        <a:bodyPr/>
+        <a:lstStyle/>
+        <a:p>
+          <a:endParaRPr lang="en-US"/>
+        </a:p>
+      </dgm:t>
     </dgm:pt>
     <dgm:pt modelId="{F398484D-72F3-487E-A81E-F3037959C2BD}" type="sibTrans" cxnId="{E05EE59C-7694-4C2B-A598-EAA30A0F4D4E}">
       <dgm:prSet/>
       <dgm:spPr/>
+      <dgm:t>
+        <a:bodyPr/>
+        <a:lstStyle/>
+        <a:p>
+          <a:endParaRPr lang="en-US"/>
+        </a:p>
+      </dgm:t>
     </dgm:pt>
     <dgm:pt modelId="{05F379A8-A685-4C7A-B43F-956C9670967B}" type="pres">
       <dgm:prSet presAssocID="{872371D6-24E9-44C7-BB9F-18B571C8DA4E}" presName="linear" presStyleCnt="0">
@@ -4726,7 +4741,7 @@
         <a:p>
           <a:r>
             <a:rPr lang="en-US" dirty="0"/>
-            <a:t>4. Adjust Research Questions</a:t>
+            <a:t>4. Adjust Research Questions / API query</a:t>
           </a:r>
         </a:p>
       </dgm:t>
@@ -4834,8 +4849,8 @@
 <file path=ppt/diagrams/data4.xml><?xml version="1.0" encoding="utf-8"?>
 <dgm:dataModel xmlns:dgm="http://schemas.openxmlformats.org/drawingml/2006/diagram" xmlns:a="http://schemas.openxmlformats.org/drawingml/2006/main">
   <dgm:ptLst>
-    <dgm:pt modelId="{AFCEAB5A-5418-4197-948C-31D4B5029269}" type="doc">
-      <dgm:prSet loTypeId="urn:microsoft.com/office/officeart/2005/8/layout/chevron2" loCatId="list" qsTypeId="urn:microsoft.com/office/officeart/2005/8/quickstyle/simple1" qsCatId="simple" csTypeId="urn:microsoft.com/office/officeart/2005/8/colors/accent1_2" csCatId="accent1" phldr="1"/>
+    <dgm:pt modelId="{ED942960-5F75-4B1C-A4FF-76070CBDAA9F}" type="doc">
+      <dgm:prSet loTypeId="urn:microsoft.com/office/officeart/2005/8/layout/vList6" loCatId="list" qsTypeId="urn:microsoft.com/office/officeart/2005/8/quickstyle/simple1" qsCatId="simple" csTypeId="urn:microsoft.com/office/officeart/2005/8/colors/accent1_2" csCatId="accent1" phldr="1"/>
       <dgm:spPr/>
       <dgm:t>
         <a:bodyPr/>
@@ -4845,21 +4860,21 @@
         </a:p>
       </dgm:t>
     </dgm:pt>
-    <dgm:pt modelId="{627B6B4F-4BD8-4530-A2FD-B233DEB25C40}">
-      <dgm:prSet phldrT="[Text]"/>
+    <dgm:pt modelId="{6294226F-F2F2-4A8A-9E6C-AECCEDD39148}">
+      <dgm:prSet phldrT="[Text]" custT="1"/>
       <dgm:spPr/>
       <dgm:t>
         <a:bodyPr/>
         <a:lstStyle/>
         <a:p>
           <a:r>
-            <a:rPr lang="en-US" dirty="0"/>
-            <a:t>244</a:t>
+            <a:rPr lang="en-US" sz="2400" dirty="0"/>
+            <a:t>167</a:t>
           </a:r>
         </a:p>
       </dgm:t>
     </dgm:pt>
-    <dgm:pt modelId="{88FE42E1-8CE2-42BE-B470-21AFA5AED954}" type="parTrans" cxnId="{AE3C08BE-0400-40FD-958D-F2FB1297B92F}">
+    <dgm:pt modelId="{ECF84622-2253-4470-B157-F3AADA3244CB}" type="parTrans" cxnId="{4F565258-2AEE-4AE9-A2EC-423A7EF4B7E4}">
       <dgm:prSet/>
       <dgm:spPr/>
       <dgm:t>
@@ -4870,7 +4885,7 @@
         </a:p>
       </dgm:t>
     </dgm:pt>
-    <dgm:pt modelId="{37694709-0451-49D6-9A8D-2106D6680E14}" type="sibTrans" cxnId="{AE3C08BE-0400-40FD-958D-F2FB1297B92F}">
+    <dgm:pt modelId="{E24D1D34-49BA-47A7-BABF-6E5AD93C88AD}" type="sibTrans" cxnId="{4F565258-2AEE-4AE9-A2EC-423A7EF4B7E4}">
       <dgm:prSet/>
       <dgm:spPr/>
       <dgm:t>
@@ -4881,21 +4896,21 @@
         </a:p>
       </dgm:t>
     </dgm:pt>
-    <dgm:pt modelId="{BF934A6F-B028-4ECE-B0BA-8B56DC220637}">
-      <dgm:prSet phldrT="[Text]"/>
+    <dgm:pt modelId="{9CA1B036-4F3E-4330-A15C-36003DB98924}">
+      <dgm:prSet phldrT="[Text]" custT="1"/>
       <dgm:spPr/>
       <dgm:t>
         <a:bodyPr/>
         <a:lstStyle/>
         <a:p>
           <a:r>
-            <a:rPr lang="en-US" dirty="0"/>
-            <a:t>Average days to complete story post</a:t>
+            <a:rPr lang="en-US" sz="2400" dirty="0"/>
+            <a:t>19</a:t>
           </a:r>
         </a:p>
       </dgm:t>
     </dgm:pt>
-    <dgm:pt modelId="{B759EBD7-5DEA-4717-8B9E-447CA1174435}" type="parTrans" cxnId="{F8901C33-89BF-4C26-A2AC-FE1B5D868EAE}">
+    <dgm:pt modelId="{81AFAF62-5A40-45BE-BCDA-F7EB54BAB804}" type="parTrans" cxnId="{0E115642-25C8-4081-8A58-84933E07EDE2}">
       <dgm:prSet/>
       <dgm:spPr/>
       <dgm:t>
@@ -4906,7 +4921,7 @@
         </a:p>
       </dgm:t>
     </dgm:pt>
-    <dgm:pt modelId="{A07865E4-D460-441C-A724-677D2535DA80}" type="sibTrans" cxnId="{F8901C33-89BF-4C26-A2AC-FE1B5D868EAE}">
+    <dgm:pt modelId="{5ABD1543-008E-4E32-B63E-88B361C71BD7}" type="sibTrans" cxnId="{0E115642-25C8-4081-8A58-84933E07EDE2}">
       <dgm:prSet/>
       <dgm:spPr/>
       <dgm:t>
@@ -4917,21 +4932,35 @@
         </a:p>
       </dgm:t>
     </dgm:pt>
-    <dgm:pt modelId="{300C7799-1563-44BA-A645-D6A88A68F767}">
-      <dgm:prSet phldrT="[Text]"/>
+    <dgm:pt modelId="{908A783A-3B75-4DB6-BBAB-96DE82FF367A}">
+      <dgm:prSet phldrT="[Text]" custT="1"/>
       <dgm:spPr/>
       <dgm:t>
-        <a:bodyPr/>
+        <a:bodyPr anchor="ctr"/>
         <a:lstStyle/>
         <a:p>
+          <a:pPr>
+            <a:buClrTx/>
+            <a:buSzTx/>
+            <a:buFontTx/>
+            <a:buNone/>
+          </a:pPr>
           <a:r>
-            <a:rPr lang="en-US" dirty="0"/>
-            <a:t>12</a:t>
+            <a:rPr lang="en-US" sz="1400" dirty="0"/>
+            <a:t>   </a:t>
+          </a:r>
+          <a:r>
+            <a:rPr lang="en-US" sz="1400" dirty="0" err="1"/>
+            <a:t>Avg</a:t>
+          </a:r>
+          <a:r>
+            <a:rPr lang="en-US" sz="1400" dirty="0"/>
+            <a:t> number of chapters in a story</a:t>
           </a:r>
         </a:p>
       </dgm:t>
     </dgm:pt>
-    <dgm:pt modelId="{9DDC3730-4F7F-4B1F-A87E-AFF3D28C22CC}" type="parTrans" cxnId="{63947BD4-8579-4CCA-856F-F2E9BFC66E3F}">
+    <dgm:pt modelId="{9DA391BC-F453-49B9-9352-31910C97C93A}" type="parTrans" cxnId="{ED07E891-7A68-4533-A572-FB4C4D927BDB}">
       <dgm:prSet/>
       <dgm:spPr/>
       <dgm:t>
@@ -4942,7 +4971,7 @@
         </a:p>
       </dgm:t>
     </dgm:pt>
-    <dgm:pt modelId="{22FBB5D5-BBAD-487E-ADD8-9BEC9746FD69}" type="sibTrans" cxnId="{63947BD4-8579-4CCA-856F-F2E9BFC66E3F}">
+    <dgm:pt modelId="{305CCAD6-8BD9-4AAC-AD76-F9E1222DE8A7}" type="sibTrans" cxnId="{ED07E891-7A68-4533-A572-FB4C4D927BDB}">
       <dgm:prSet/>
       <dgm:spPr/>
       <dgm:t>
@@ -4953,21 +4982,21 @@
         </a:p>
       </dgm:t>
     </dgm:pt>
-    <dgm:pt modelId="{7F3694EA-69EB-4F3A-94EC-7440EA799F82}">
-      <dgm:prSet phldrT="[Text]"/>
+    <dgm:pt modelId="{85298BC2-0AB4-4F19-B891-DC4001932FFC}">
+      <dgm:prSet phldrT="[Text]" custT="1"/>
       <dgm:spPr/>
       <dgm:t>
         <a:bodyPr/>
         <a:lstStyle/>
         <a:p>
           <a:r>
-            <a:rPr lang="en-US" dirty="0"/>
-            <a:t>Average number of chapters in a story</a:t>
+            <a:rPr lang="en-US" sz="2400" dirty="0"/>
+            <a:t>59,780</a:t>
           </a:r>
         </a:p>
       </dgm:t>
     </dgm:pt>
-    <dgm:pt modelId="{CB481374-57E3-4B23-86D7-CC6837807015}" type="parTrans" cxnId="{EFC72D1E-102E-4815-A547-3D73A8529CE7}">
+    <dgm:pt modelId="{ED569577-D760-4D50-B9E3-B2286116BFB6}" type="parTrans" cxnId="{6C046703-5231-4650-BA58-F4129775C5C0}">
       <dgm:prSet/>
       <dgm:spPr/>
       <dgm:t>
@@ -4978,7 +5007,7 @@
         </a:p>
       </dgm:t>
     </dgm:pt>
-    <dgm:pt modelId="{D1CBD1BE-9336-4882-A8E4-FBCE18BA5CEC}" type="sibTrans" cxnId="{EFC72D1E-102E-4815-A547-3D73A8529CE7}">
+    <dgm:pt modelId="{844E8EB3-90A4-461E-9854-641228D00786}" type="sibTrans" cxnId="{6C046703-5231-4650-BA58-F4129775C5C0}">
       <dgm:prSet/>
       <dgm:spPr/>
       <dgm:t>
@@ -4989,21 +5018,29 @@
         </a:p>
       </dgm:t>
     </dgm:pt>
-    <dgm:pt modelId="{6B83C9CF-C0EA-4129-911B-381A96403788}">
-      <dgm:prSet phldrT="[Text]"/>
+    <dgm:pt modelId="{203BE068-1EAF-4AC1-977B-CE0473B75916}">
+      <dgm:prSet phldrT="[Text]" custT="1"/>
       <dgm:spPr/>
       <dgm:t>
-        <a:bodyPr/>
+        <a:bodyPr anchor="ctr"/>
         <a:lstStyle/>
         <a:p>
           <a:r>
-            <a:rPr lang="en-US" dirty="0"/>
-            <a:t>Average number of words in a story</a:t>
+            <a:rPr lang="en-US" sz="1400" dirty="0"/>
+            <a:t> </a:t>
+          </a:r>
+          <a:r>
+            <a:rPr lang="en-US" sz="1400" dirty="0" err="1"/>
+            <a:t>Avg</a:t>
+          </a:r>
+          <a:r>
+            <a:rPr lang="en-US" sz="1400" dirty="0"/>
+            <a:t> number of words in a story</a:t>
           </a:r>
         </a:p>
       </dgm:t>
     </dgm:pt>
-    <dgm:pt modelId="{54C42EF5-90B8-4DE4-BE59-72D58D9D3136}" type="parTrans" cxnId="{2B55AD72-9B50-4E80-A780-9145428391E5}">
+    <dgm:pt modelId="{60E17AD7-5FB7-4561-A2C7-D1DAD918D521}" type="parTrans" cxnId="{395A58F3-CC47-476E-8D6A-45826DED86B6}">
       <dgm:prSet/>
       <dgm:spPr/>
       <dgm:t>
@@ -5014,7 +5051,7 @@
         </a:p>
       </dgm:t>
     </dgm:pt>
-    <dgm:pt modelId="{947D9D76-8BEE-44DE-B5E2-BC9DE3993956}" type="sibTrans" cxnId="{2B55AD72-9B50-4E80-A780-9145428391E5}">
+    <dgm:pt modelId="{62BE56E0-5F5E-449D-91DD-3DBF2EF6642C}" type="sibTrans" cxnId="{395A58F3-CC47-476E-8D6A-45826DED86B6}">
       <dgm:prSet/>
       <dgm:spPr/>
       <dgm:t>
@@ -5025,21 +5062,30 @@
         </a:p>
       </dgm:t>
     </dgm:pt>
-    <dgm:pt modelId="{FF2A8D47-D211-4026-A519-ABFD0DDDC6A2}">
-      <dgm:prSet phldrT="[Text]"/>
+    <dgm:pt modelId="{2B03C335-2E7F-4885-872C-1C073708494F}">
+      <dgm:prSet phldrT="[Text]" custT="1"/>
       <dgm:spPr/>
       <dgm:t>
-        <a:bodyPr/>
+        <a:bodyPr anchor="ctr"/>
         <a:lstStyle/>
         <a:p>
           <a:r>
-            <a:rPr lang="en-US" dirty="0"/>
-            <a:t>Story length does not appear to relate to story popularity</a:t>
+            <a:rPr lang="en-US" sz="1400" dirty="0"/>
+            <a:t>  </a:t>
           </a:r>
+          <a:r>
+            <a:rPr lang="en-US" sz="1400" dirty="0" err="1"/>
+            <a:t>Avg</a:t>
+          </a:r>
+          <a:r>
+            <a:rPr lang="en-US" sz="1400" dirty="0"/>
+            <a:t> days to complete story post</a:t>
+          </a:r>
+          <a:endParaRPr lang="en-US" sz="2400" dirty="0"/>
         </a:p>
       </dgm:t>
     </dgm:pt>
-    <dgm:pt modelId="{36C26B72-D602-4CFB-9F91-14001E9CA4D6}" type="parTrans" cxnId="{8771C4D4-CD7A-4390-931D-6CD560DB5262}">
+    <dgm:pt modelId="{7B2EC6EB-E96D-47ED-993B-8DB3C5FA7B84}" type="parTrans" cxnId="{4902197A-9257-40C4-9E8B-85A75E483155}">
       <dgm:prSet/>
       <dgm:spPr/>
       <dgm:t>
@@ -5050,7 +5096,7 @@
         </a:p>
       </dgm:t>
     </dgm:pt>
-    <dgm:pt modelId="{B9CE8765-1F36-4495-A912-6ECCC30B5DBA}" type="sibTrans" cxnId="{8771C4D4-CD7A-4390-931D-6CD560DB5262}">
+    <dgm:pt modelId="{35469379-AD2B-45FF-9395-6C6A41E50F9C}" type="sibTrans" cxnId="{4902197A-9257-40C4-9E8B-85A75E483155}">
       <dgm:prSet/>
       <dgm:spPr/>
       <dgm:t>
@@ -5061,175 +5107,78 @@
         </a:p>
       </dgm:t>
     </dgm:pt>
-    <dgm:pt modelId="{EEEF5206-5B9D-4EA6-B03E-0E73E828B78E}">
-      <dgm:prSet phldrT="[Text]"/>
-      <dgm:spPr/>
-      <dgm:t>
-        <a:bodyPr/>
-        <a:lstStyle/>
-        <a:p>
-          <a:r>
-            <a:rPr lang="en-US" dirty="0"/>
-            <a:t>75,265</a:t>
-          </a:r>
-        </a:p>
-      </dgm:t>
-    </dgm:pt>
-    <dgm:pt modelId="{EE2BFCB3-585B-44E4-8B4C-C43F2113939F}" type="parTrans" cxnId="{4074AA81-69A4-4453-AA3A-F45B74B9B0BD}">
-      <dgm:prSet/>
-      <dgm:spPr/>
-      <dgm:t>
-        <a:bodyPr/>
-        <a:lstStyle/>
-        <a:p>
-          <a:endParaRPr lang="en-US"/>
-        </a:p>
-      </dgm:t>
-    </dgm:pt>
-    <dgm:pt modelId="{A0C41F75-F430-4E51-9AF9-B633D66CCC8F}" type="sibTrans" cxnId="{4074AA81-69A4-4453-AA3A-F45B74B9B0BD}">
-      <dgm:prSet/>
-      <dgm:spPr/>
-      <dgm:t>
-        <a:bodyPr/>
-        <a:lstStyle/>
-        <a:p>
-          <a:endParaRPr lang="en-US"/>
-        </a:p>
-      </dgm:t>
-    </dgm:pt>
-    <dgm:pt modelId="{308059E1-2A4A-4DBA-92A4-16B85D11B83C}">
-      <dgm:prSet phldrT="[Text]"/>
-      <dgm:spPr/>
-      <dgm:t>
-        <a:bodyPr/>
-        <a:lstStyle/>
-        <a:p>
-          <a:endParaRPr lang="en-US" dirty="0"/>
-        </a:p>
-      </dgm:t>
-    </dgm:pt>
-    <dgm:pt modelId="{2FF00F87-54CD-4262-8893-F014C82DA178}" type="parTrans" cxnId="{5EEA54F6-7BB3-4C6A-86BF-E1461D971EC4}">
-      <dgm:prSet/>
-      <dgm:spPr/>
-      <dgm:t>
-        <a:bodyPr/>
-        <a:lstStyle/>
-        <a:p>
-          <a:endParaRPr lang="en-US"/>
-        </a:p>
-      </dgm:t>
-    </dgm:pt>
-    <dgm:pt modelId="{4B586774-B932-4D85-B271-99EA3BB6E625}" type="sibTrans" cxnId="{5EEA54F6-7BB3-4C6A-86BF-E1461D971EC4}">
-      <dgm:prSet/>
-      <dgm:spPr/>
-      <dgm:t>
-        <a:bodyPr/>
-        <a:lstStyle/>
-        <a:p>
-          <a:endParaRPr lang="en-US"/>
-        </a:p>
-      </dgm:t>
-    </dgm:pt>
-    <dgm:pt modelId="{A96C526E-6B40-4C9D-AF15-92D5185C8C67}" type="pres">
-      <dgm:prSet presAssocID="{AFCEAB5A-5418-4197-948C-31D4B5029269}" presName="linearFlow" presStyleCnt="0">
+    <dgm:pt modelId="{5FB25AFF-B39B-40DF-B45F-851225C42F04}" type="pres">
+      <dgm:prSet presAssocID="{ED942960-5F75-4B1C-A4FF-76070CBDAA9F}" presName="Name0" presStyleCnt="0">
         <dgm:presLayoutVars>
           <dgm:dir/>
           <dgm:animLvl val="lvl"/>
-          <dgm:resizeHandles val="exact"/>
+          <dgm:resizeHandles/>
         </dgm:presLayoutVars>
       </dgm:prSet>
       <dgm:spPr/>
     </dgm:pt>
-    <dgm:pt modelId="{4147AE17-CA19-4529-9C05-43F6483D35A3}" type="pres">
-      <dgm:prSet presAssocID="{627B6B4F-4BD8-4530-A2FD-B233DEB25C40}" presName="composite" presStyleCnt="0"/>
+    <dgm:pt modelId="{4027794D-3BE4-412A-8767-69C77222EB0C}" type="pres">
+      <dgm:prSet presAssocID="{6294226F-F2F2-4A8A-9E6C-AECCEDD39148}" presName="linNode" presStyleCnt="0"/>
       <dgm:spPr/>
     </dgm:pt>
-    <dgm:pt modelId="{474848AD-2000-499B-B1C4-B03B69715E8D}" type="pres">
-      <dgm:prSet presAssocID="{627B6B4F-4BD8-4530-A2FD-B233DEB25C40}" presName="parentText" presStyleLbl="alignNode1" presStyleIdx="0" presStyleCnt="4">
-        <dgm:presLayoutVars>
-          <dgm:chMax val="1"/>
-          <dgm:bulletEnabled val="1"/>
-        </dgm:presLayoutVars>
-      </dgm:prSet>
-      <dgm:spPr/>
-    </dgm:pt>
-    <dgm:pt modelId="{FA2A0F8C-91F1-4218-BC3C-937C2E00479E}" type="pres">
-      <dgm:prSet presAssocID="{627B6B4F-4BD8-4530-A2FD-B233DEB25C40}" presName="descendantText" presStyleLbl="alignAcc1" presStyleIdx="0" presStyleCnt="4" custLinFactNeighborX="16084" custLinFactNeighborY="-26706">
+    <dgm:pt modelId="{63F9587C-242F-42AA-B7E8-6DA6E215418C}" type="pres">
+      <dgm:prSet presAssocID="{6294226F-F2F2-4A8A-9E6C-AECCEDD39148}" presName="parentShp" presStyleLbl="node1" presStyleIdx="0" presStyleCnt="3" custScaleX="77324" custScaleY="50641">
         <dgm:presLayoutVars>
           <dgm:bulletEnabled val="1"/>
         </dgm:presLayoutVars>
       </dgm:prSet>
       <dgm:spPr/>
     </dgm:pt>
-    <dgm:pt modelId="{36D12A64-827E-4CD5-A115-B20A133CFDB3}" type="pres">
-      <dgm:prSet presAssocID="{37694709-0451-49D6-9A8D-2106D6680E14}" presName="sp" presStyleCnt="0"/>
-      <dgm:spPr/>
-    </dgm:pt>
-    <dgm:pt modelId="{E53255AC-4F7D-40FB-9309-331D521C3527}" type="pres">
-      <dgm:prSet presAssocID="{300C7799-1563-44BA-A645-D6A88A68F767}" presName="composite" presStyleCnt="0"/>
-      <dgm:spPr/>
-    </dgm:pt>
-    <dgm:pt modelId="{5323F542-D004-4F03-9511-85AAA5553078}" type="pres">
-      <dgm:prSet presAssocID="{300C7799-1563-44BA-A645-D6A88A68F767}" presName="parentText" presStyleLbl="alignNode1" presStyleIdx="1" presStyleCnt="4">
-        <dgm:presLayoutVars>
-          <dgm:chMax val="1"/>
-          <dgm:bulletEnabled val="1"/>
-        </dgm:presLayoutVars>
-      </dgm:prSet>
-      <dgm:spPr/>
-    </dgm:pt>
-    <dgm:pt modelId="{5B02451F-207C-40A7-A650-E85FA5207172}" type="pres">
-      <dgm:prSet presAssocID="{300C7799-1563-44BA-A645-D6A88A68F767}" presName="descendantText" presStyleLbl="alignAcc1" presStyleIdx="1" presStyleCnt="4">
+    <dgm:pt modelId="{674C8BD2-CB80-4DB6-9CDC-B02E4460B03B}" type="pres">
+      <dgm:prSet presAssocID="{6294226F-F2F2-4A8A-9E6C-AECCEDD39148}" presName="childShp" presStyleLbl="bgAccFollowNode1" presStyleIdx="0" presStyleCnt="3" custScaleY="47976">
         <dgm:presLayoutVars>
           <dgm:bulletEnabled val="1"/>
         </dgm:presLayoutVars>
       </dgm:prSet>
       <dgm:spPr/>
     </dgm:pt>
-    <dgm:pt modelId="{2F6E0263-E9FE-4720-9FED-E39256F666DF}" type="pres">
-      <dgm:prSet presAssocID="{22FBB5D5-BBAD-487E-ADD8-9BEC9746FD69}" presName="sp" presStyleCnt="0"/>
+    <dgm:pt modelId="{81C06303-F1CB-41B1-94B6-F4308EC79B5B}" type="pres">
+      <dgm:prSet presAssocID="{E24D1D34-49BA-47A7-BABF-6E5AD93C88AD}" presName="spacing" presStyleCnt="0"/>
       <dgm:spPr/>
     </dgm:pt>
-    <dgm:pt modelId="{A008DFFF-16E9-43ED-B8E1-7AD8178B18CC}" type="pres">
-      <dgm:prSet presAssocID="{EEEF5206-5B9D-4EA6-B03E-0E73E828B78E}" presName="composite" presStyleCnt="0"/>
+    <dgm:pt modelId="{A0816C3C-E45E-483C-A7EF-BCB753FCE9E6}" type="pres">
+      <dgm:prSet presAssocID="{9CA1B036-4F3E-4330-A15C-36003DB98924}" presName="linNode" presStyleCnt="0"/>
       <dgm:spPr/>
     </dgm:pt>
-    <dgm:pt modelId="{01F15282-0E9C-4B19-A586-26347154B521}" type="pres">
-      <dgm:prSet presAssocID="{EEEF5206-5B9D-4EA6-B03E-0E73E828B78E}" presName="parentText" presStyleLbl="alignNode1" presStyleIdx="2" presStyleCnt="4">
-        <dgm:presLayoutVars>
-          <dgm:chMax val="1"/>
-          <dgm:bulletEnabled val="1"/>
-        </dgm:presLayoutVars>
-      </dgm:prSet>
-      <dgm:spPr/>
-    </dgm:pt>
-    <dgm:pt modelId="{30F41FFE-F254-46E7-8543-CE48D97B40E0}" type="pres">
-      <dgm:prSet presAssocID="{EEEF5206-5B9D-4EA6-B03E-0E73E828B78E}" presName="descendantText" presStyleLbl="alignAcc1" presStyleIdx="2" presStyleCnt="4">
+    <dgm:pt modelId="{9EE4943B-5157-47C6-9B4C-C2D91AADD587}" type="pres">
+      <dgm:prSet presAssocID="{9CA1B036-4F3E-4330-A15C-36003DB98924}" presName="parentShp" presStyleLbl="node1" presStyleIdx="1" presStyleCnt="3" custScaleX="77324" custScaleY="50641">
         <dgm:presLayoutVars>
           <dgm:bulletEnabled val="1"/>
         </dgm:presLayoutVars>
       </dgm:prSet>
       <dgm:spPr/>
     </dgm:pt>
-    <dgm:pt modelId="{C87B4F35-CA0F-43F2-9006-6CFB976A5085}" type="pres">
-      <dgm:prSet presAssocID="{A0C41F75-F430-4E51-9AF9-B633D66CCC8F}" presName="sp" presStyleCnt="0"/>
-      <dgm:spPr/>
-    </dgm:pt>
-    <dgm:pt modelId="{411A1049-0A69-4E5B-9077-8E2196119F7E}" type="pres">
-      <dgm:prSet presAssocID="{308059E1-2A4A-4DBA-92A4-16B85D11B83C}" presName="composite" presStyleCnt="0"/>
-      <dgm:spPr/>
-    </dgm:pt>
-    <dgm:pt modelId="{33FD62A2-2BDF-4806-9942-7E19CCF0775C}" type="pres">
-      <dgm:prSet presAssocID="{308059E1-2A4A-4DBA-92A4-16B85D11B83C}" presName="parentText" presStyleLbl="alignNode1" presStyleIdx="3" presStyleCnt="4">
+    <dgm:pt modelId="{E74CF8E4-301D-4366-8616-5FB1AC5D8472}" type="pres">
+      <dgm:prSet presAssocID="{9CA1B036-4F3E-4330-A15C-36003DB98924}" presName="childShp" presStyleLbl="bgAccFollowNode1" presStyleIdx="1" presStyleCnt="3" custScaleY="52682">
         <dgm:presLayoutVars>
-          <dgm:chMax val="1"/>
           <dgm:bulletEnabled val="1"/>
         </dgm:presLayoutVars>
       </dgm:prSet>
       <dgm:spPr/>
     </dgm:pt>
-    <dgm:pt modelId="{18A1967B-CC53-4FAF-8CD8-D37F5CEB4DC0}" type="pres">
-      <dgm:prSet presAssocID="{308059E1-2A4A-4DBA-92A4-16B85D11B83C}" presName="descendantText" presStyleLbl="alignAcc1" presStyleIdx="3" presStyleCnt="4">
+    <dgm:pt modelId="{CFC2E030-48D2-48B6-B173-2901C5C399F3}" type="pres">
+      <dgm:prSet presAssocID="{5ABD1543-008E-4E32-B63E-88B361C71BD7}" presName="spacing" presStyleCnt="0"/>
+      <dgm:spPr/>
+    </dgm:pt>
+    <dgm:pt modelId="{165A425E-F903-486D-A432-DE34AB15AB08}" type="pres">
+      <dgm:prSet presAssocID="{85298BC2-0AB4-4F19-B891-DC4001932FFC}" presName="linNode" presStyleCnt="0"/>
+      <dgm:spPr/>
+    </dgm:pt>
+    <dgm:pt modelId="{D3173932-1BEF-42AD-A2D3-06A5A860A365}" type="pres">
+      <dgm:prSet presAssocID="{85298BC2-0AB4-4F19-B891-DC4001932FFC}" presName="parentShp" presStyleLbl="node1" presStyleIdx="2" presStyleCnt="3" custScaleX="77429" custScaleY="50658">
+        <dgm:presLayoutVars>
+          <dgm:bulletEnabled val="1"/>
+        </dgm:presLayoutVars>
+      </dgm:prSet>
+      <dgm:spPr/>
+    </dgm:pt>
+    <dgm:pt modelId="{3217746E-CFED-41D8-8FB0-DD70DBF9846F}" type="pres">
+      <dgm:prSet presAssocID="{85298BC2-0AB4-4F19-B891-DC4001932FFC}" presName="childShp" presStyleLbl="bgAccFollowNode1" presStyleIdx="2" presStyleCnt="3" custScaleY="50928">
         <dgm:presLayoutVars>
           <dgm:bulletEnabled val="1"/>
         </dgm:presLayoutVars>
@@ -5238,44 +5187,36 @@
     </dgm:pt>
   </dgm:ptLst>
   <dgm:cxnLst>
-    <dgm:cxn modelId="{9A2C610B-E80C-4AFB-AA56-FD48E707129F}" type="presOf" srcId="{EEEF5206-5B9D-4EA6-B03E-0E73E828B78E}" destId="{01F15282-0E9C-4B19-A586-26347154B521}" srcOrd="0" destOrd="0" presId="urn:microsoft.com/office/officeart/2005/8/layout/chevron2"/>
-    <dgm:cxn modelId="{82D1AE12-3688-497B-ACEF-1602E9D56555}" type="presOf" srcId="{BF934A6F-B028-4ECE-B0BA-8B56DC220637}" destId="{FA2A0F8C-91F1-4218-BC3C-937C2E00479E}" srcOrd="0" destOrd="0" presId="urn:microsoft.com/office/officeart/2005/8/layout/chevron2"/>
-    <dgm:cxn modelId="{EFC72D1E-102E-4815-A547-3D73A8529CE7}" srcId="{300C7799-1563-44BA-A645-D6A88A68F767}" destId="{7F3694EA-69EB-4F3A-94EC-7440EA799F82}" srcOrd="0" destOrd="0" parTransId="{CB481374-57E3-4B23-86D7-CC6837807015}" sibTransId="{D1CBD1BE-9336-4882-A8E4-FBCE18BA5CEC}"/>
-    <dgm:cxn modelId="{F8901C33-89BF-4C26-A2AC-FE1B5D868EAE}" srcId="{627B6B4F-4BD8-4530-A2FD-B233DEB25C40}" destId="{BF934A6F-B028-4ECE-B0BA-8B56DC220637}" srcOrd="0" destOrd="0" parTransId="{B759EBD7-5DEA-4717-8B9E-447CA1174435}" sibTransId="{A07865E4-D460-441C-A724-677D2535DA80}"/>
-    <dgm:cxn modelId="{7C82AF5E-2C12-4CEF-BC7E-21F339082D84}" type="presOf" srcId="{FF2A8D47-D211-4026-A519-ABFD0DDDC6A2}" destId="{18A1967B-CC53-4FAF-8CD8-D37F5CEB4DC0}" srcOrd="0" destOrd="0" presId="urn:microsoft.com/office/officeart/2005/8/layout/chevron2"/>
-    <dgm:cxn modelId="{4129B143-A088-44B0-B6A5-F08A593DEE7F}" type="presOf" srcId="{308059E1-2A4A-4DBA-92A4-16B85D11B83C}" destId="{33FD62A2-2BDF-4806-9942-7E19CCF0775C}" srcOrd="0" destOrd="0" presId="urn:microsoft.com/office/officeart/2005/8/layout/chevron2"/>
-    <dgm:cxn modelId="{42100D66-21E9-4C39-98AF-4DB4976A903B}" type="presOf" srcId="{627B6B4F-4BD8-4530-A2FD-B233DEB25C40}" destId="{474848AD-2000-499B-B1C4-B03B69715E8D}" srcOrd="0" destOrd="0" presId="urn:microsoft.com/office/officeart/2005/8/layout/chevron2"/>
-    <dgm:cxn modelId="{6AF6AE50-2C5E-4040-94D5-BD2455BC7085}" type="presOf" srcId="{7F3694EA-69EB-4F3A-94EC-7440EA799F82}" destId="{5B02451F-207C-40A7-A650-E85FA5207172}" srcOrd="0" destOrd="0" presId="urn:microsoft.com/office/officeart/2005/8/layout/chevron2"/>
-    <dgm:cxn modelId="{2B55AD72-9B50-4E80-A780-9145428391E5}" srcId="{EEEF5206-5B9D-4EA6-B03E-0E73E828B78E}" destId="{6B83C9CF-C0EA-4129-911B-381A96403788}" srcOrd="0" destOrd="0" parTransId="{54C42EF5-90B8-4DE4-BE59-72D58D9D3136}" sibTransId="{947D9D76-8BEE-44DE-B5E2-BC9DE3993956}"/>
-    <dgm:cxn modelId="{4074AA81-69A4-4453-AA3A-F45B74B9B0BD}" srcId="{AFCEAB5A-5418-4197-948C-31D4B5029269}" destId="{EEEF5206-5B9D-4EA6-B03E-0E73E828B78E}" srcOrd="2" destOrd="0" parTransId="{EE2BFCB3-585B-44E4-8B4C-C43F2113939F}" sibTransId="{A0C41F75-F430-4E51-9AF9-B633D66CCC8F}"/>
-    <dgm:cxn modelId="{8F07419F-278B-47A7-9AAA-1EC96BEE4285}" type="presOf" srcId="{6B83C9CF-C0EA-4129-911B-381A96403788}" destId="{30F41FFE-F254-46E7-8543-CE48D97B40E0}" srcOrd="0" destOrd="0" presId="urn:microsoft.com/office/officeart/2005/8/layout/chevron2"/>
-    <dgm:cxn modelId="{AE3C08BE-0400-40FD-958D-F2FB1297B92F}" srcId="{AFCEAB5A-5418-4197-948C-31D4B5029269}" destId="{627B6B4F-4BD8-4530-A2FD-B233DEB25C40}" srcOrd="0" destOrd="0" parTransId="{88FE42E1-8CE2-42BE-B470-21AFA5AED954}" sibTransId="{37694709-0451-49D6-9A8D-2106D6680E14}"/>
-    <dgm:cxn modelId="{63947BD4-8579-4CCA-856F-F2E9BFC66E3F}" srcId="{AFCEAB5A-5418-4197-948C-31D4B5029269}" destId="{300C7799-1563-44BA-A645-D6A88A68F767}" srcOrd="1" destOrd="0" parTransId="{9DDC3730-4F7F-4B1F-A87E-AFF3D28C22CC}" sibTransId="{22FBB5D5-BBAD-487E-ADD8-9BEC9746FD69}"/>
-    <dgm:cxn modelId="{8771C4D4-CD7A-4390-931D-6CD560DB5262}" srcId="{308059E1-2A4A-4DBA-92A4-16B85D11B83C}" destId="{FF2A8D47-D211-4026-A519-ABFD0DDDC6A2}" srcOrd="0" destOrd="0" parTransId="{36C26B72-D602-4CFB-9F91-14001E9CA4D6}" sibTransId="{B9CE8765-1F36-4495-A912-6ECCC30B5DBA}"/>
-    <dgm:cxn modelId="{823CE3D5-671C-4D17-AA12-301C19DD8635}" type="presOf" srcId="{AFCEAB5A-5418-4197-948C-31D4B5029269}" destId="{A96C526E-6B40-4C9D-AF15-92D5185C8C67}" srcOrd="0" destOrd="0" presId="urn:microsoft.com/office/officeart/2005/8/layout/chevron2"/>
-    <dgm:cxn modelId="{7C587EF5-6947-41B7-A7FD-5C7C91A37A9A}" type="presOf" srcId="{300C7799-1563-44BA-A645-D6A88A68F767}" destId="{5323F542-D004-4F03-9511-85AAA5553078}" srcOrd="0" destOrd="0" presId="urn:microsoft.com/office/officeart/2005/8/layout/chevron2"/>
-    <dgm:cxn modelId="{5EEA54F6-7BB3-4C6A-86BF-E1461D971EC4}" srcId="{AFCEAB5A-5418-4197-948C-31D4B5029269}" destId="{308059E1-2A4A-4DBA-92A4-16B85D11B83C}" srcOrd="3" destOrd="0" parTransId="{2FF00F87-54CD-4262-8893-F014C82DA178}" sibTransId="{4B586774-B932-4D85-B271-99EA3BB6E625}"/>
-    <dgm:cxn modelId="{F43C0CDE-6A69-4E13-9312-2847A15674C8}" type="presParOf" srcId="{A96C526E-6B40-4C9D-AF15-92D5185C8C67}" destId="{4147AE17-CA19-4529-9C05-43F6483D35A3}" srcOrd="0" destOrd="0" presId="urn:microsoft.com/office/officeart/2005/8/layout/chevron2"/>
-    <dgm:cxn modelId="{8D892BAD-CD14-4C71-B505-48BA6DAFD9F1}" type="presParOf" srcId="{4147AE17-CA19-4529-9C05-43F6483D35A3}" destId="{474848AD-2000-499B-B1C4-B03B69715E8D}" srcOrd="0" destOrd="0" presId="urn:microsoft.com/office/officeart/2005/8/layout/chevron2"/>
-    <dgm:cxn modelId="{D97ACAE0-315B-4C12-9FE9-6907A9E72F23}" type="presParOf" srcId="{4147AE17-CA19-4529-9C05-43F6483D35A3}" destId="{FA2A0F8C-91F1-4218-BC3C-937C2E00479E}" srcOrd="1" destOrd="0" presId="urn:microsoft.com/office/officeart/2005/8/layout/chevron2"/>
-    <dgm:cxn modelId="{F8966EC9-E035-4C27-9357-B781FE9166E4}" type="presParOf" srcId="{A96C526E-6B40-4C9D-AF15-92D5185C8C67}" destId="{36D12A64-827E-4CD5-A115-B20A133CFDB3}" srcOrd="1" destOrd="0" presId="urn:microsoft.com/office/officeart/2005/8/layout/chevron2"/>
-    <dgm:cxn modelId="{2AB193A5-8043-4342-A4CC-2F7BE15B1E6D}" type="presParOf" srcId="{A96C526E-6B40-4C9D-AF15-92D5185C8C67}" destId="{E53255AC-4F7D-40FB-9309-331D521C3527}" srcOrd="2" destOrd="0" presId="urn:microsoft.com/office/officeart/2005/8/layout/chevron2"/>
-    <dgm:cxn modelId="{3893D487-AEE8-4C21-AD10-4797E8F309BA}" type="presParOf" srcId="{E53255AC-4F7D-40FB-9309-331D521C3527}" destId="{5323F542-D004-4F03-9511-85AAA5553078}" srcOrd="0" destOrd="0" presId="urn:microsoft.com/office/officeart/2005/8/layout/chevron2"/>
-    <dgm:cxn modelId="{C2073BE5-E717-476C-86B0-5D379C0457AC}" type="presParOf" srcId="{E53255AC-4F7D-40FB-9309-331D521C3527}" destId="{5B02451F-207C-40A7-A650-E85FA5207172}" srcOrd="1" destOrd="0" presId="urn:microsoft.com/office/officeart/2005/8/layout/chevron2"/>
-    <dgm:cxn modelId="{9F4CE263-ADD4-433F-8A58-2443091AE5E1}" type="presParOf" srcId="{A96C526E-6B40-4C9D-AF15-92D5185C8C67}" destId="{2F6E0263-E9FE-4720-9FED-E39256F666DF}" srcOrd="3" destOrd="0" presId="urn:microsoft.com/office/officeart/2005/8/layout/chevron2"/>
-    <dgm:cxn modelId="{756BFEE5-8035-4C7B-ACF6-6CF1E67FA92F}" type="presParOf" srcId="{A96C526E-6B40-4C9D-AF15-92D5185C8C67}" destId="{A008DFFF-16E9-43ED-B8E1-7AD8178B18CC}" srcOrd="4" destOrd="0" presId="urn:microsoft.com/office/officeart/2005/8/layout/chevron2"/>
-    <dgm:cxn modelId="{1583819A-2F16-41C0-B46B-6F89E99358C5}" type="presParOf" srcId="{A008DFFF-16E9-43ED-B8E1-7AD8178B18CC}" destId="{01F15282-0E9C-4B19-A586-26347154B521}" srcOrd="0" destOrd="0" presId="urn:microsoft.com/office/officeart/2005/8/layout/chevron2"/>
-    <dgm:cxn modelId="{2B4DD9DD-DEF1-40CD-BCB9-C0A36DE209C8}" type="presParOf" srcId="{A008DFFF-16E9-43ED-B8E1-7AD8178B18CC}" destId="{30F41FFE-F254-46E7-8543-CE48D97B40E0}" srcOrd="1" destOrd="0" presId="urn:microsoft.com/office/officeart/2005/8/layout/chevron2"/>
-    <dgm:cxn modelId="{581104F2-443C-4769-9ED8-0CFEF3DC3464}" type="presParOf" srcId="{A96C526E-6B40-4C9D-AF15-92D5185C8C67}" destId="{C87B4F35-CA0F-43F2-9006-6CFB976A5085}" srcOrd="5" destOrd="0" presId="urn:microsoft.com/office/officeart/2005/8/layout/chevron2"/>
-    <dgm:cxn modelId="{96A16919-8850-4FFF-8214-74EBC7F6F57F}" type="presParOf" srcId="{A96C526E-6B40-4C9D-AF15-92D5185C8C67}" destId="{411A1049-0A69-4E5B-9077-8E2196119F7E}" srcOrd="6" destOrd="0" presId="urn:microsoft.com/office/officeart/2005/8/layout/chevron2"/>
-    <dgm:cxn modelId="{E87DDB25-7440-4134-A5E5-9653C0595159}" type="presParOf" srcId="{411A1049-0A69-4E5B-9077-8E2196119F7E}" destId="{33FD62A2-2BDF-4806-9942-7E19CCF0775C}" srcOrd="0" destOrd="0" presId="urn:microsoft.com/office/officeart/2005/8/layout/chevron2"/>
-    <dgm:cxn modelId="{5F250C19-0D45-45BB-9327-1CCFCC8D20DD}" type="presParOf" srcId="{411A1049-0A69-4E5B-9077-8E2196119F7E}" destId="{18A1967B-CC53-4FAF-8CD8-D37F5CEB4DC0}" srcOrd="1" destOrd="0" presId="urn:microsoft.com/office/officeart/2005/8/layout/chevron2"/>
+    <dgm:cxn modelId="{6C046703-5231-4650-BA58-F4129775C5C0}" srcId="{ED942960-5F75-4B1C-A4FF-76070CBDAA9F}" destId="{85298BC2-0AB4-4F19-B891-DC4001932FFC}" srcOrd="2" destOrd="0" parTransId="{ED569577-D760-4D50-B9E3-B2286116BFB6}" sibTransId="{844E8EB3-90A4-461E-9854-641228D00786}"/>
+    <dgm:cxn modelId="{0E115642-25C8-4081-8A58-84933E07EDE2}" srcId="{ED942960-5F75-4B1C-A4FF-76070CBDAA9F}" destId="{9CA1B036-4F3E-4330-A15C-36003DB98924}" srcOrd="1" destOrd="0" parTransId="{81AFAF62-5A40-45BE-BCDA-F7EB54BAB804}" sibTransId="{5ABD1543-008E-4E32-B63E-88B361C71BD7}"/>
+    <dgm:cxn modelId="{18EB1F64-6243-4E54-9930-0BCFC27E98C4}" type="presOf" srcId="{85298BC2-0AB4-4F19-B891-DC4001932FFC}" destId="{D3173932-1BEF-42AD-A2D3-06A5A860A365}" srcOrd="0" destOrd="0" presId="urn:microsoft.com/office/officeart/2005/8/layout/vList6"/>
+    <dgm:cxn modelId="{50DBDD66-817B-4411-AC23-A89C5A7D1510}" type="presOf" srcId="{2B03C335-2E7F-4885-872C-1C073708494F}" destId="{674C8BD2-CB80-4DB6-9CDC-B02E4460B03B}" srcOrd="0" destOrd="0" presId="urn:microsoft.com/office/officeart/2005/8/layout/vList6"/>
+    <dgm:cxn modelId="{4F565258-2AEE-4AE9-A2EC-423A7EF4B7E4}" srcId="{ED942960-5F75-4B1C-A4FF-76070CBDAA9F}" destId="{6294226F-F2F2-4A8A-9E6C-AECCEDD39148}" srcOrd="0" destOrd="0" parTransId="{ECF84622-2253-4470-B157-F3AADA3244CB}" sibTransId="{E24D1D34-49BA-47A7-BABF-6E5AD93C88AD}"/>
+    <dgm:cxn modelId="{4902197A-9257-40C4-9E8B-85A75E483155}" srcId="{6294226F-F2F2-4A8A-9E6C-AECCEDD39148}" destId="{2B03C335-2E7F-4885-872C-1C073708494F}" srcOrd="0" destOrd="0" parTransId="{7B2EC6EB-E96D-47ED-993B-8DB3C5FA7B84}" sibTransId="{35469379-AD2B-45FF-9395-6C6A41E50F9C}"/>
+    <dgm:cxn modelId="{ED07E891-7A68-4533-A572-FB4C4D927BDB}" srcId="{9CA1B036-4F3E-4330-A15C-36003DB98924}" destId="{908A783A-3B75-4DB6-BBAB-96DE82FF367A}" srcOrd="0" destOrd="0" parTransId="{9DA391BC-F453-49B9-9352-31910C97C93A}" sibTransId="{305CCAD6-8BD9-4AAC-AD76-F9E1222DE8A7}"/>
+    <dgm:cxn modelId="{2855E1B1-35C6-4821-8EFF-55994C841841}" type="presOf" srcId="{ED942960-5F75-4B1C-A4FF-76070CBDAA9F}" destId="{5FB25AFF-B39B-40DF-B45F-851225C42F04}" srcOrd="0" destOrd="0" presId="urn:microsoft.com/office/officeart/2005/8/layout/vList6"/>
+    <dgm:cxn modelId="{684FF9C9-F794-47D4-91D8-842734CA5918}" type="presOf" srcId="{908A783A-3B75-4DB6-BBAB-96DE82FF367A}" destId="{E74CF8E4-301D-4366-8616-5FB1AC5D8472}" srcOrd="0" destOrd="0" presId="urn:microsoft.com/office/officeart/2005/8/layout/vList6"/>
+    <dgm:cxn modelId="{8D79F1CF-0F09-48EB-AF13-4EFEC5F86A58}" type="presOf" srcId="{203BE068-1EAF-4AC1-977B-CE0473B75916}" destId="{3217746E-CFED-41D8-8FB0-DD70DBF9846F}" srcOrd="0" destOrd="0" presId="urn:microsoft.com/office/officeart/2005/8/layout/vList6"/>
+    <dgm:cxn modelId="{13D797E2-78A2-43CB-9135-55DB916A2976}" type="presOf" srcId="{6294226F-F2F2-4A8A-9E6C-AECCEDD39148}" destId="{63F9587C-242F-42AA-B7E8-6DA6E215418C}" srcOrd="0" destOrd="0" presId="urn:microsoft.com/office/officeart/2005/8/layout/vList6"/>
+    <dgm:cxn modelId="{395A58F3-CC47-476E-8D6A-45826DED86B6}" srcId="{85298BC2-0AB4-4F19-B891-DC4001932FFC}" destId="{203BE068-1EAF-4AC1-977B-CE0473B75916}" srcOrd="0" destOrd="0" parTransId="{60E17AD7-5FB7-4561-A2C7-D1DAD918D521}" sibTransId="{62BE56E0-5F5E-449D-91DD-3DBF2EF6642C}"/>
+    <dgm:cxn modelId="{BCA51AF5-F5C2-4323-A0B0-1F2CC120DFD9}" type="presOf" srcId="{9CA1B036-4F3E-4330-A15C-36003DB98924}" destId="{9EE4943B-5157-47C6-9B4C-C2D91AADD587}" srcOrd="0" destOrd="0" presId="urn:microsoft.com/office/officeart/2005/8/layout/vList6"/>
+    <dgm:cxn modelId="{3E42614F-AE04-4110-A819-010EBD342206}" type="presParOf" srcId="{5FB25AFF-B39B-40DF-B45F-851225C42F04}" destId="{4027794D-3BE4-412A-8767-69C77222EB0C}" srcOrd="0" destOrd="0" presId="urn:microsoft.com/office/officeart/2005/8/layout/vList6"/>
+    <dgm:cxn modelId="{63FDDB8D-A92D-4E9D-8A6F-8C902FCC3D21}" type="presParOf" srcId="{4027794D-3BE4-412A-8767-69C77222EB0C}" destId="{63F9587C-242F-42AA-B7E8-6DA6E215418C}" srcOrd="0" destOrd="0" presId="urn:microsoft.com/office/officeart/2005/8/layout/vList6"/>
+    <dgm:cxn modelId="{96EC7500-38D0-410B-8258-05F36F925041}" type="presParOf" srcId="{4027794D-3BE4-412A-8767-69C77222EB0C}" destId="{674C8BD2-CB80-4DB6-9CDC-B02E4460B03B}" srcOrd="1" destOrd="0" presId="urn:microsoft.com/office/officeart/2005/8/layout/vList6"/>
+    <dgm:cxn modelId="{AF26CFEF-093D-4AD1-BD45-E0855E56B3DB}" type="presParOf" srcId="{5FB25AFF-B39B-40DF-B45F-851225C42F04}" destId="{81C06303-F1CB-41B1-94B6-F4308EC79B5B}" srcOrd="1" destOrd="0" presId="urn:microsoft.com/office/officeart/2005/8/layout/vList6"/>
+    <dgm:cxn modelId="{F2ED08F4-6649-4CF3-BFD7-158F38AEC738}" type="presParOf" srcId="{5FB25AFF-B39B-40DF-B45F-851225C42F04}" destId="{A0816C3C-E45E-483C-A7EF-BCB753FCE9E6}" srcOrd="2" destOrd="0" presId="urn:microsoft.com/office/officeart/2005/8/layout/vList6"/>
+    <dgm:cxn modelId="{0D49BED0-7327-42B9-AA76-B57504F8D7A2}" type="presParOf" srcId="{A0816C3C-E45E-483C-A7EF-BCB753FCE9E6}" destId="{9EE4943B-5157-47C6-9B4C-C2D91AADD587}" srcOrd="0" destOrd="0" presId="urn:microsoft.com/office/officeart/2005/8/layout/vList6"/>
+    <dgm:cxn modelId="{502CBBBD-A8C7-41B5-9039-DA4D50EB5D55}" type="presParOf" srcId="{A0816C3C-E45E-483C-A7EF-BCB753FCE9E6}" destId="{E74CF8E4-301D-4366-8616-5FB1AC5D8472}" srcOrd="1" destOrd="0" presId="urn:microsoft.com/office/officeart/2005/8/layout/vList6"/>
+    <dgm:cxn modelId="{2ECE2F9D-BBDB-4BC9-8FB1-B310880FA1FD}" type="presParOf" srcId="{5FB25AFF-B39B-40DF-B45F-851225C42F04}" destId="{CFC2E030-48D2-48B6-B173-2901C5C399F3}" srcOrd="3" destOrd="0" presId="urn:microsoft.com/office/officeart/2005/8/layout/vList6"/>
+    <dgm:cxn modelId="{16B8E2F1-97CB-49D6-96BF-591EA164DB79}" type="presParOf" srcId="{5FB25AFF-B39B-40DF-B45F-851225C42F04}" destId="{165A425E-F903-486D-A432-DE34AB15AB08}" srcOrd="4" destOrd="0" presId="urn:microsoft.com/office/officeart/2005/8/layout/vList6"/>
+    <dgm:cxn modelId="{EB051DE6-A0DE-4001-8D87-4B6DC9AAC9A8}" type="presParOf" srcId="{165A425E-F903-486D-A432-DE34AB15AB08}" destId="{D3173932-1BEF-42AD-A2D3-06A5A860A365}" srcOrd="0" destOrd="0" presId="urn:microsoft.com/office/officeart/2005/8/layout/vList6"/>
+    <dgm:cxn modelId="{A65824C1-414E-4BB2-A295-D2AE52B20B3B}" type="presParOf" srcId="{165A425E-F903-486D-A432-DE34AB15AB08}" destId="{3217746E-CFED-41D8-8FB0-DD70DBF9846F}" srcOrd="1" destOrd="0" presId="urn:microsoft.com/office/officeart/2005/8/layout/vList6"/>
   </dgm:cxnLst>
   <dgm:bg/>
   <dgm:whole/>
   <dgm:extLst>
     <a:ext uri="http://schemas.microsoft.com/office/drawing/2008/diagram">
-      <dsp:dataModelExt xmlns:dsp="http://schemas.microsoft.com/office/drawing/2008/diagram" relId="rId7" minVer="http://schemas.openxmlformats.org/drawingml/2006/diagram"/>
+      <dsp:dataModelExt xmlns:dsp="http://schemas.microsoft.com/office/drawing/2008/diagram" relId="rId6" minVer="http://schemas.openxmlformats.org/drawingml/2006/diagram"/>
     </a:ext>
   </dgm:extLst>
 </dgm:dataModel>
@@ -7088,7 +7029,7 @@
           </a:pPr>
           <a:r>
             <a:rPr lang="en-US" sz="1600" kern="1200" dirty="0"/>
-            <a:t>4. Adjust Research Questions</a:t>
+            <a:t>4. Adjust Research Questions / API query</a:t>
           </a:r>
         </a:p>
       </dsp:txBody>
@@ -7109,17 +7050,108 @@
       <dsp:cNvGrpSpPr/>
     </dsp:nvGrpSpPr>
     <dsp:grpSpPr/>
-    <dsp:sp modelId="{474848AD-2000-499B-B1C4-B03B69715E8D}">
+    <dsp:sp modelId="{674C8BD2-CB80-4DB6-9CDC-B02E4460B03B}">
       <dsp:nvSpPr>
         <dsp:cNvPr id="0" name=""/>
         <dsp:cNvSpPr/>
       </dsp:nvSpPr>
       <dsp:spPr>
-        <a:xfrm rot="5400000">
-          <a:off x="-104865" y="104879"/>
-          <a:ext cx="699101" cy="489370"/>
+        <a:xfrm>
+          <a:off x="1719503" y="16786"/>
+          <a:ext cx="2909087" cy="563110"/>
         </a:xfrm>
-        <a:prstGeom prst="chevron">
+        <a:prstGeom prst="rightArrow">
+          <a:avLst>
+            <a:gd name="adj1" fmla="val 75000"/>
+            <a:gd name="adj2" fmla="val 50000"/>
+          </a:avLst>
+        </a:prstGeom>
+        <a:solidFill>
+          <a:schemeClr val="accent1">
+            <a:alpha val="90000"/>
+            <a:tint val="40000"/>
+            <a:hueOff val="0"/>
+            <a:satOff val="0"/>
+            <a:lumOff val="0"/>
+            <a:alphaOff val="0"/>
+          </a:schemeClr>
+        </a:solidFill>
+        <a:ln w="12700" cap="flat" cmpd="sng" algn="ctr">
+          <a:solidFill>
+            <a:schemeClr val="accent1">
+              <a:alpha val="90000"/>
+              <a:tint val="40000"/>
+              <a:hueOff val="0"/>
+              <a:satOff val="0"/>
+              <a:lumOff val="0"/>
+              <a:alphaOff val="0"/>
+            </a:schemeClr>
+          </a:solidFill>
+          <a:prstDash val="solid"/>
+        </a:ln>
+        <a:effectLst/>
+      </dsp:spPr>
+      <dsp:style>
+        <a:lnRef idx="2">
+          <a:scrgbClr r="0" g="0" b="0"/>
+        </a:lnRef>
+        <a:fillRef idx="1">
+          <a:scrgbClr r="0" g="0" b="0"/>
+        </a:fillRef>
+        <a:effectRef idx="0">
+          <a:scrgbClr r="0" g="0" b="0"/>
+        </a:effectRef>
+        <a:fontRef idx="minor"/>
+      </dsp:style>
+      <dsp:txBody>
+        <a:bodyPr spcFirstLastPara="0" vert="horz" wrap="square" lIns="8890" tIns="8890" rIns="8890" bIns="8890" numCol="1" spcCol="1270" anchor="ctr" anchorCtr="0">
+          <a:noAutofit/>
+        </a:bodyPr>
+        <a:lstStyle/>
+        <a:p>
+          <a:pPr marL="114300" lvl="1" indent="-114300" algn="l" defTabSz="622300">
+            <a:lnSpc>
+              <a:spcPct val="90000"/>
+            </a:lnSpc>
+            <a:spcBef>
+              <a:spcPct val="0"/>
+            </a:spcBef>
+            <a:spcAft>
+              <a:spcPct val="15000"/>
+            </a:spcAft>
+            <a:buChar char="•"/>
+          </a:pPr>
+          <a:r>
+            <a:rPr lang="en-US" sz="1400" kern="1200" dirty="0"/>
+            <a:t>  </a:t>
+          </a:r>
+          <a:r>
+            <a:rPr lang="en-US" sz="1400" kern="1200" dirty="0" err="1"/>
+            <a:t>Avg</a:t>
+          </a:r>
+          <a:r>
+            <a:rPr lang="en-US" sz="1400" kern="1200" dirty="0"/>
+            <a:t> days to complete story post</a:t>
+          </a:r>
+          <a:endParaRPr lang="en-US" sz="2400" kern="1200" dirty="0"/>
+        </a:p>
+      </dsp:txBody>
+      <dsp:txXfrm>
+        <a:off x="1719503" y="87175"/>
+        <a:ext cx="2697921" cy="422332"/>
+      </dsp:txXfrm>
+    </dsp:sp>
+    <dsp:sp modelId="{63F9587C-242F-42AA-B7E8-6DA6E215418C}">
+      <dsp:nvSpPr>
+        <dsp:cNvPr id="0" name=""/>
+        <dsp:cNvSpPr/>
+      </dsp:nvSpPr>
+      <dsp:spPr>
+        <a:xfrm>
+          <a:off x="219888" y="1146"/>
+          <a:ext cx="1499615" cy="594390"/>
+        </a:xfrm>
+        <a:prstGeom prst="roundRect">
           <a:avLst/>
         </a:prstGeom>
         <a:solidFill>
@@ -7132,7 +7164,7 @@
         </a:solidFill>
         <a:ln w="12700" cap="flat" cmpd="sng" algn="ctr">
           <a:solidFill>
-            <a:schemeClr val="accent1">
+            <a:schemeClr val="lt1">
               <a:hueOff val="0"/>
               <a:satOff val="0"/>
               <a:lumOff val="0"/>
@@ -7158,12 +7190,12 @@
         </a:fontRef>
       </dsp:style>
       <dsp:txBody>
-        <a:bodyPr spcFirstLastPara="0" vert="horz" wrap="square" lIns="8255" tIns="8255" rIns="8255" bIns="8255" numCol="1" spcCol="1270" anchor="ctr" anchorCtr="0">
+        <a:bodyPr spcFirstLastPara="0" vert="horz" wrap="square" lIns="91440" tIns="45720" rIns="91440" bIns="45720" numCol="1" spcCol="1270" anchor="ctr" anchorCtr="0">
           <a:noAutofit/>
         </a:bodyPr>
         <a:lstStyle/>
         <a:p>
-          <a:pPr marL="0" lvl="0" indent="0" algn="ctr" defTabSz="577850">
+          <a:pPr marL="0" lvl="0" indent="0" algn="ctr" defTabSz="1066800">
             <a:lnSpc>
               <a:spcPct val="90000"/>
             </a:lnSpc>
@@ -7176,32 +7208,36 @@
             <a:buNone/>
           </a:pPr>
           <a:r>
-            <a:rPr lang="en-US" sz="1300" kern="1200" dirty="0"/>
-            <a:t>244</a:t>
+            <a:rPr lang="en-US" sz="2400" kern="1200" dirty="0"/>
+            <a:t>167</a:t>
           </a:r>
         </a:p>
       </dsp:txBody>
-      <dsp:txXfrm rot="-5400000">
-        <a:off x="1" y="244698"/>
-        <a:ext cx="489370" cy="209731"/>
+      <dsp:txXfrm>
+        <a:off x="248904" y="30162"/>
+        <a:ext cx="1441583" cy="536358"/>
       </dsp:txXfrm>
     </dsp:sp>
-    <dsp:sp modelId="{FA2A0F8C-91F1-4218-BC3C-937C2E00479E}">
+    <dsp:sp modelId="{E74CF8E4-301D-4366-8616-5FB1AC5D8472}">
       <dsp:nvSpPr>
         <dsp:cNvPr id="0" name=""/>
         <dsp:cNvSpPr/>
       </dsp:nvSpPr>
       <dsp:spPr>
-        <a:xfrm rot="5400000">
-          <a:off x="2038627" y="-1549256"/>
-          <a:ext cx="454415" cy="3552928"/>
+        <a:xfrm>
+          <a:off x="1719503" y="712910"/>
+          <a:ext cx="2909087" cy="618346"/>
         </a:xfrm>
-        <a:prstGeom prst="round2SameRect">
-          <a:avLst/>
+        <a:prstGeom prst="rightArrow">
+          <a:avLst>
+            <a:gd name="adj1" fmla="val 75000"/>
+            <a:gd name="adj2" fmla="val 50000"/>
+          </a:avLst>
         </a:prstGeom>
         <a:solidFill>
-          <a:schemeClr val="lt1">
+          <a:schemeClr val="accent1">
             <a:alpha val="90000"/>
+            <a:tint val="40000"/>
             <a:hueOff val="0"/>
             <a:satOff val="0"/>
             <a:lumOff val="0"/>
@@ -7211,6 +7247,8 @@
         <a:ln w="12700" cap="flat" cmpd="sng" algn="ctr">
           <a:solidFill>
             <a:schemeClr val="accent1">
+              <a:alpha val="90000"/>
+              <a:tint val="40000"/>
               <a:hueOff val="0"/>
               <a:satOff val="0"/>
               <a:lumOff val="0"/>
@@ -7234,7 +7272,7 @@
         <a:fontRef idx="minor"/>
       </dsp:style>
       <dsp:txBody>
-        <a:bodyPr spcFirstLastPara="0" vert="horz" wrap="square" lIns="99568" tIns="8890" rIns="8890" bIns="8890" numCol="1" spcCol="1270" anchor="ctr" anchorCtr="0">
+        <a:bodyPr spcFirstLastPara="0" vert="horz" wrap="square" lIns="8890" tIns="8890" rIns="8890" bIns="8890" numCol="1" spcCol="1270" anchor="ctr" anchorCtr="0">
           <a:noAutofit/>
         </a:bodyPr>
         <a:lstStyle/>
@@ -7249,30 +7287,41 @@
             <a:spcAft>
               <a:spcPct val="15000"/>
             </a:spcAft>
-            <a:buChar char="•"/>
+            <a:buClrTx/>
+            <a:buSzTx/>
+            <a:buFontTx/>
+            <a:buNone/>
           </a:pPr>
           <a:r>
             <a:rPr lang="en-US" sz="1400" kern="1200" dirty="0"/>
-            <a:t>Average days to complete story post</a:t>
+            <a:t>   </a:t>
+          </a:r>
+          <a:r>
+            <a:rPr lang="en-US" sz="1400" kern="1200" dirty="0" err="1"/>
+            <a:t>Avg</a:t>
+          </a:r>
+          <a:r>
+            <a:rPr lang="en-US" sz="1400" kern="1200" dirty="0"/>
+            <a:t> number of chapters in a story</a:t>
           </a:r>
         </a:p>
       </dsp:txBody>
-      <dsp:txXfrm rot="-5400000">
-        <a:off x="489371" y="22183"/>
-        <a:ext cx="3530745" cy="410049"/>
+      <dsp:txXfrm>
+        <a:off x="1719503" y="790203"/>
+        <a:ext cx="2677207" cy="463760"/>
       </dsp:txXfrm>
     </dsp:sp>
-    <dsp:sp modelId="{5323F542-D004-4F03-9511-85AAA5553078}">
+    <dsp:sp modelId="{9EE4943B-5157-47C6-9B4C-C2D91AADD587}">
       <dsp:nvSpPr>
         <dsp:cNvPr id="0" name=""/>
         <dsp:cNvSpPr/>
       </dsp:nvSpPr>
       <dsp:spPr>
-        <a:xfrm rot="5400000">
-          <a:off x="-104865" y="660684"/>
-          <a:ext cx="699101" cy="489370"/>
+        <a:xfrm>
+          <a:off x="219888" y="724888"/>
+          <a:ext cx="1499615" cy="594390"/>
         </a:xfrm>
-        <a:prstGeom prst="chevron">
+        <a:prstGeom prst="roundRect">
           <a:avLst/>
         </a:prstGeom>
         <a:solidFill>
@@ -7285,7 +7334,7 @@
         </a:solidFill>
         <a:ln w="12700" cap="flat" cmpd="sng" algn="ctr">
           <a:solidFill>
-            <a:schemeClr val="accent1">
+            <a:schemeClr val="lt1">
               <a:hueOff val="0"/>
               <a:satOff val="0"/>
               <a:lumOff val="0"/>
@@ -7311,12 +7360,12 @@
         </a:fontRef>
       </dsp:style>
       <dsp:txBody>
-        <a:bodyPr spcFirstLastPara="0" vert="horz" wrap="square" lIns="8255" tIns="8255" rIns="8255" bIns="8255" numCol="1" spcCol="1270" anchor="ctr" anchorCtr="0">
+        <a:bodyPr spcFirstLastPara="0" vert="horz" wrap="square" lIns="91440" tIns="45720" rIns="91440" bIns="45720" numCol="1" spcCol="1270" anchor="ctr" anchorCtr="0">
           <a:noAutofit/>
         </a:bodyPr>
         <a:lstStyle/>
         <a:p>
-          <a:pPr marL="0" lvl="0" indent="0" algn="ctr" defTabSz="577850">
+          <a:pPr marL="0" lvl="0" indent="0" algn="ctr" defTabSz="1066800">
             <a:lnSpc>
               <a:spcPct val="90000"/>
             </a:lnSpc>
@@ -7329,32 +7378,36 @@
             <a:buNone/>
           </a:pPr>
           <a:r>
-            <a:rPr lang="en-US" sz="1300" kern="1200" dirty="0"/>
-            <a:t>12</a:t>
+            <a:rPr lang="en-US" sz="2400" kern="1200" dirty="0"/>
+            <a:t>19</a:t>
           </a:r>
         </a:p>
       </dsp:txBody>
-      <dsp:txXfrm rot="-5400000">
-        <a:off x="1" y="800503"/>
-        <a:ext cx="489370" cy="209731"/>
+      <dsp:txXfrm>
+        <a:off x="248904" y="753904"/>
+        <a:ext cx="1441583" cy="536358"/>
       </dsp:txXfrm>
     </dsp:sp>
-    <dsp:sp modelId="{5B02451F-207C-40A7-A650-E85FA5207172}">
+    <dsp:sp modelId="{3217746E-CFED-41D8-8FB0-DD70DBF9846F}">
       <dsp:nvSpPr>
         <dsp:cNvPr id="0" name=""/>
         <dsp:cNvSpPr/>
       </dsp:nvSpPr>
       <dsp:spPr>
-        <a:xfrm rot="5400000">
-          <a:off x="2038627" y="-993437"/>
-          <a:ext cx="454415" cy="3552928"/>
+        <a:xfrm>
+          <a:off x="1720521" y="1448630"/>
+          <a:ext cx="2909087" cy="597759"/>
         </a:xfrm>
-        <a:prstGeom prst="round2SameRect">
-          <a:avLst/>
+        <a:prstGeom prst="rightArrow">
+          <a:avLst>
+            <a:gd name="adj1" fmla="val 75000"/>
+            <a:gd name="adj2" fmla="val 50000"/>
+          </a:avLst>
         </a:prstGeom>
         <a:solidFill>
-          <a:schemeClr val="lt1">
+          <a:schemeClr val="accent1">
             <a:alpha val="90000"/>
+            <a:tint val="40000"/>
             <a:hueOff val="0"/>
             <a:satOff val="0"/>
             <a:lumOff val="0"/>
@@ -7364,6 +7417,8 @@
         <a:ln w="12700" cap="flat" cmpd="sng" algn="ctr">
           <a:solidFill>
             <a:schemeClr val="accent1">
+              <a:alpha val="90000"/>
+              <a:tint val="40000"/>
               <a:hueOff val="0"/>
               <a:satOff val="0"/>
               <a:lumOff val="0"/>
@@ -7387,7 +7442,7 @@
         <a:fontRef idx="minor"/>
       </dsp:style>
       <dsp:txBody>
-        <a:bodyPr spcFirstLastPara="0" vert="horz" wrap="square" lIns="99568" tIns="8890" rIns="8890" bIns="8890" numCol="1" spcCol="1270" anchor="ctr" anchorCtr="0">
+        <a:bodyPr spcFirstLastPara="0" vert="horz" wrap="square" lIns="8890" tIns="8890" rIns="8890" bIns="8890" numCol="1" spcCol="1270" anchor="ctr" anchorCtr="0">
           <a:noAutofit/>
         </a:bodyPr>
         <a:lstStyle/>
@@ -7406,26 +7461,34 @@
           </a:pPr>
           <a:r>
             <a:rPr lang="en-US" sz="1400" kern="1200" dirty="0"/>
-            <a:t>Average number of chapters in a story</a:t>
+            <a:t> </a:t>
+          </a:r>
+          <a:r>
+            <a:rPr lang="en-US" sz="1400" kern="1200" dirty="0" err="1"/>
+            <a:t>Avg</a:t>
+          </a:r>
+          <a:r>
+            <a:rPr lang="en-US" sz="1400" kern="1200" dirty="0"/>
+            <a:t> number of words in a story</a:t>
           </a:r>
         </a:p>
       </dsp:txBody>
-      <dsp:txXfrm rot="-5400000">
-        <a:off x="489371" y="578002"/>
-        <a:ext cx="3530745" cy="410049"/>
+      <dsp:txXfrm>
+        <a:off x="1720521" y="1523350"/>
+        <a:ext cx="2684927" cy="448319"/>
       </dsp:txXfrm>
     </dsp:sp>
-    <dsp:sp modelId="{01F15282-0E9C-4B19-A586-26347154B521}">
+    <dsp:sp modelId="{D3173932-1BEF-42AD-A2D3-06A5A860A365}">
       <dsp:nvSpPr>
         <dsp:cNvPr id="0" name=""/>
         <dsp:cNvSpPr/>
       </dsp:nvSpPr>
       <dsp:spPr>
-        <a:xfrm rot="5400000">
-          <a:off x="-104865" y="1216488"/>
-          <a:ext cx="699101" cy="489370"/>
+        <a:xfrm>
+          <a:off x="218870" y="1450214"/>
+          <a:ext cx="1501651" cy="594590"/>
         </a:xfrm>
-        <a:prstGeom prst="chevron">
+        <a:prstGeom prst="roundRect">
           <a:avLst/>
         </a:prstGeom>
         <a:solidFill>
@@ -7438,7 +7501,7 @@
         </a:solidFill>
         <a:ln w="12700" cap="flat" cmpd="sng" algn="ctr">
           <a:solidFill>
-            <a:schemeClr val="accent1">
+            <a:schemeClr val="lt1">
               <a:hueOff val="0"/>
               <a:satOff val="0"/>
               <a:lumOff val="0"/>
@@ -7464,12 +7527,12 @@
         </a:fontRef>
       </dsp:style>
       <dsp:txBody>
-        <a:bodyPr spcFirstLastPara="0" vert="horz" wrap="square" lIns="8255" tIns="8255" rIns="8255" bIns="8255" numCol="1" spcCol="1270" anchor="ctr" anchorCtr="0">
+        <a:bodyPr spcFirstLastPara="0" vert="horz" wrap="square" lIns="91440" tIns="45720" rIns="91440" bIns="45720" numCol="1" spcCol="1270" anchor="ctr" anchorCtr="0">
           <a:noAutofit/>
         </a:bodyPr>
         <a:lstStyle/>
         <a:p>
-          <a:pPr marL="0" lvl="0" indent="0" algn="ctr" defTabSz="577850">
+          <a:pPr marL="0" lvl="0" indent="0" algn="ctr" defTabSz="1066800">
             <a:lnSpc>
               <a:spcPct val="90000"/>
             </a:lnSpc>
@@ -7482,240 +7545,14 @@
             <a:buNone/>
           </a:pPr>
           <a:r>
-            <a:rPr lang="en-US" sz="1300" kern="1200" dirty="0"/>
-            <a:t>75,265</a:t>
+            <a:rPr lang="en-US" sz="2400" kern="1200" dirty="0"/>
+            <a:t>59,780</a:t>
           </a:r>
         </a:p>
       </dsp:txBody>
-      <dsp:txXfrm rot="-5400000">
-        <a:off x="1" y="1356307"/>
-        <a:ext cx="489370" cy="209731"/>
-      </dsp:txXfrm>
-    </dsp:sp>
-    <dsp:sp modelId="{30F41FFE-F254-46E7-8543-CE48D97B40E0}">
-      <dsp:nvSpPr>
-        <dsp:cNvPr id="0" name=""/>
-        <dsp:cNvSpPr/>
-      </dsp:nvSpPr>
-      <dsp:spPr>
-        <a:xfrm rot="5400000">
-          <a:off x="2038627" y="-437632"/>
-          <a:ext cx="454415" cy="3552928"/>
-        </a:xfrm>
-        <a:prstGeom prst="round2SameRect">
-          <a:avLst/>
-        </a:prstGeom>
-        <a:solidFill>
-          <a:schemeClr val="lt1">
-            <a:alpha val="90000"/>
-            <a:hueOff val="0"/>
-            <a:satOff val="0"/>
-            <a:lumOff val="0"/>
-            <a:alphaOff val="0"/>
-          </a:schemeClr>
-        </a:solidFill>
-        <a:ln w="12700" cap="flat" cmpd="sng" algn="ctr">
-          <a:solidFill>
-            <a:schemeClr val="accent1">
-              <a:hueOff val="0"/>
-              <a:satOff val="0"/>
-              <a:lumOff val="0"/>
-              <a:alphaOff val="0"/>
-            </a:schemeClr>
-          </a:solidFill>
-          <a:prstDash val="solid"/>
-        </a:ln>
-        <a:effectLst/>
-      </dsp:spPr>
-      <dsp:style>
-        <a:lnRef idx="2">
-          <a:scrgbClr r="0" g="0" b="0"/>
-        </a:lnRef>
-        <a:fillRef idx="1">
-          <a:scrgbClr r="0" g="0" b="0"/>
-        </a:fillRef>
-        <a:effectRef idx="0">
-          <a:scrgbClr r="0" g="0" b="0"/>
-        </a:effectRef>
-        <a:fontRef idx="minor"/>
-      </dsp:style>
-      <dsp:txBody>
-        <a:bodyPr spcFirstLastPara="0" vert="horz" wrap="square" lIns="99568" tIns="8890" rIns="8890" bIns="8890" numCol="1" spcCol="1270" anchor="ctr" anchorCtr="0">
-          <a:noAutofit/>
-        </a:bodyPr>
-        <a:lstStyle/>
-        <a:p>
-          <a:pPr marL="114300" lvl="1" indent="-114300" algn="l" defTabSz="622300">
-            <a:lnSpc>
-              <a:spcPct val="90000"/>
-            </a:lnSpc>
-            <a:spcBef>
-              <a:spcPct val="0"/>
-            </a:spcBef>
-            <a:spcAft>
-              <a:spcPct val="15000"/>
-            </a:spcAft>
-            <a:buChar char="•"/>
-          </a:pPr>
-          <a:r>
-            <a:rPr lang="en-US" sz="1400" kern="1200" dirty="0"/>
-            <a:t>Average number of words in a story</a:t>
-          </a:r>
-        </a:p>
-      </dsp:txBody>
-      <dsp:txXfrm rot="-5400000">
-        <a:off x="489371" y="1133807"/>
-        <a:ext cx="3530745" cy="410049"/>
-      </dsp:txXfrm>
-    </dsp:sp>
-    <dsp:sp modelId="{33FD62A2-2BDF-4806-9942-7E19CCF0775C}">
-      <dsp:nvSpPr>
-        <dsp:cNvPr id="0" name=""/>
-        <dsp:cNvSpPr/>
-      </dsp:nvSpPr>
-      <dsp:spPr>
-        <a:xfrm rot="5400000">
-          <a:off x="-104865" y="1772293"/>
-          <a:ext cx="699101" cy="489370"/>
-        </a:xfrm>
-        <a:prstGeom prst="chevron">
-          <a:avLst/>
-        </a:prstGeom>
-        <a:solidFill>
-          <a:schemeClr val="accent1">
-            <a:hueOff val="0"/>
-            <a:satOff val="0"/>
-            <a:lumOff val="0"/>
-            <a:alphaOff val="0"/>
-          </a:schemeClr>
-        </a:solidFill>
-        <a:ln w="12700" cap="flat" cmpd="sng" algn="ctr">
-          <a:solidFill>
-            <a:schemeClr val="accent1">
-              <a:hueOff val="0"/>
-              <a:satOff val="0"/>
-              <a:lumOff val="0"/>
-              <a:alphaOff val="0"/>
-            </a:schemeClr>
-          </a:solidFill>
-          <a:prstDash val="solid"/>
-        </a:ln>
-        <a:effectLst/>
-      </dsp:spPr>
-      <dsp:style>
-        <a:lnRef idx="2">
-          <a:scrgbClr r="0" g="0" b="0"/>
-        </a:lnRef>
-        <a:fillRef idx="1">
-          <a:scrgbClr r="0" g="0" b="0"/>
-        </a:fillRef>
-        <a:effectRef idx="0">
-          <a:scrgbClr r="0" g="0" b="0"/>
-        </a:effectRef>
-        <a:fontRef idx="minor">
-          <a:schemeClr val="lt1"/>
-        </a:fontRef>
-      </dsp:style>
-      <dsp:txBody>
-        <a:bodyPr spcFirstLastPara="0" vert="horz" wrap="square" lIns="8255" tIns="8255" rIns="8255" bIns="8255" numCol="1" spcCol="1270" anchor="ctr" anchorCtr="0">
-          <a:noAutofit/>
-        </a:bodyPr>
-        <a:lstStyle/>
-        <a:p>
-          <a:pPr marL="0" lvl="0" indent="0" algn="ctr" defTabSz="577850">
-            <a:lnSpc>
-              <a:spcPct val="90000"/>
-            </a:lnSpc>
-            <a:spcBef>
-              <a:spcPct val="0"/>
-            </a:spcBef>
-            <a:spcAft>
-              <a:spcPct val="35000"/>
-            </a:spcAft>
-            <a:buNone/>
-          </a:pPr>
-          <a:endParaRPr lang="en-US" sz="1300" kern="1200" dirty="0"/>
-        </a:p>
-      </dsp:txBody>
-      <dsp:txXfrm rot="-5400000">
-        <a:off x="1" y="1912112"/>
-        <a:ext cx="489370" cy="209731"/>
-      </dsp:txXfrm>
-    </dsp:sp>
-    <dsp:sp modelId="{18A1967B-CC53-4FAF-8CD8-D37F5CEB4DC0}">
-      <dsp:nvSpPr>
-        <dsp:cNvPr id="0" name=""/>
-        <dsp:cNvSpPr/>
-      </dsp:nvSpPr>
-      <dsp:spPr>
-        <a:xfrm rot="5400000">
-          <a:off x="2038627" y="118172"/>
-          <a:ext cx="454415" cy="3552928"/>
-        </a:xfrm>
-        <a:prstGeom prst="round2SameRect">
-          <a:avLst/>
-        </a:prstGeom>
-        <a:solidFill>
-          <a:schemeClr val="lt1">
-            <a:alpha val="90000"/>
-            <a:hueOff val="0"/>
-            <a:satOff val="0"/>
-            <a:lumOff val="0"/>
-            <a:alphaOff val="0"/>
-          </a:schemeClr>
-        </a:solidFill>
-        <a:ln w="12700" cap="flat" cmpd="sng" algn="ctr">
-          <a:solidFill>
-            <a:schemeClr val="accent1">
-              <a:hueOff val="0"/>
-              <a:satOff val="0"/>
-              <a:lumOff val="0"/>
-              <a:alphaOff val="0"/>
-            </a:schemeClr>
-          </a:solidFill>
-          <a:prstDash val="solid"/>
-        </a:ln>
-        <a:effectLst/>
-      </dsp:spPr>
-      <dsp:style>
-        <a:lnRef idx="2">
-          <a:scrgbClr r="0" g="0" b="0"/>
-        </a:lnRef>
-        <a:fillRef idx="1">
-          <a:scrgbClr r="0" g="0" b="0"/>
-        </a:fillRef>
-        <a:effectRef idx="0">
-          <a:scrgbClr r="0" g="0" b="0"/>
-        </a:effectRef>
-        <a:fontRef idx="minor"/>
-      </dsp:style>
-      <dsp:txBody>
-        <a:bodyPr spcFirstLastPara="0" vert="horz" wrap="square" lIns="99568" tIns="8890" rIns="8890" bIns="8890" numCol="1" spcCol="1270" anchor="ctr" anchorCtr="0">
-          <a:noAutofit/>
-        </a:bodyPr>
-        <a:lstStyle/>
-        <a:p>
-          <a:pPr marL="114300" lvl="1" indent="-114300" algn="l" defTabSz="622300">
-            <a:lnSpc>
-              <a:spcPct val="90000"/>
-            </a:lnSpc>
-            <a:spcBef>
-              <a:spcPct val="0"/>
-            </a:spcBef>
-            <a:spcAft>
-              <a:spcPct val="15000"/>
-            </a:spcAft>
-            <a:buChar char="•"/>
-          </a:pPr>
-          <a:r>
-            <a:rPr lang="en-US" sz="1400" kern="1200" dirty="0"/>
-            <a:t>Story length does not appear to relate to story popularity</a:t>
-          </a:r>
-        </a:p>
-      </dsp:txBody>
-      <dsp:txXfrm rot="-5400000">
-        <a:off x="489371" y="1689612"/>
-        <a:ext cx="3530745" cy="410049"/>
+      <dsp:txXfrm>
+        <a:off x="247895" y="1479239"/>
+        <a:ext cx="1443601" cy="536540"/>
       </dsp:txXfrm>
     </dsp:sp>
   </dsp:spTree>
@@ -9236,13 +9073,12 @@
 </file>
 
 <file path=ppt/diagrams/layout4.xml><?xml version="1.0" encoding="utf-8"?>
-<dgm:layoutDef xmlns:dgm="http://schemas.openxmlformats.org/drawingml/2006/diagram" xmlns:a="http://schemas.openxmlformats.org/drawingml/2006/main" uniqueId="urn:microsoft.com/office/officeart/2005/8/layout/chevron2">
+<dgm:layoutDef xmlns:dgm="http://schemas.openxmlformats.org/drawingml/2006/diagram" xmlns:a="http://schemas.openxmlformats.org/drawingml/2006/main" uniqueId="urn:microsoft.com/office/officeart/2005/8/layout/vList6">
   <dgm:title val=""/>
   <dgm:desc val=""/>
   <dgm:catLst>
-    <dgm:cat type="process" pri="12000"/>
-    <dgm:cat type="list" pri="16000"/>
-    <dgm:cat type="convert" pri="11000"/>
+    <dgm:cat type="process" pri="22000"/>
+    <dgm:cat type="list" pri="17000"/>
   </dgm:catLst>
   <dgm:sampData>
     <dgm:dataModel>
@@ -9266,26 +9102,14 @@
         <dgm:pt modelId="22">
           <dgm:prSet phldr="1"/>
         </dgm:pt>
-        <dgm:pt modelId="3">
-          <dgm:prSet phldr="1"/>
-        </dgm:pt>
-        <dgm:pt modelId="31">
-          <dgm:prSet phldr="1"/>
-        </dgm:pt>
-        <dgm:pt modelId="32">
-          <dgm:prSet phldr="1"/>
-        </dgm:pt>
       </dgm:ptLst>
       <dgm:cxnLst>
         <dgm:cxn modelId="4" srcId="0" destId="1" srcOrd="0" destOrd="0"/>
         <dgm:cxn modelId="5" srcId="0" destId="2" srcOrd="1" destOrd="0"/>
-        <dgm:cxn modelId="6" srcId="0" destId="3" srcOrd="2" destOrd="0"/>
         <dgm:cxn modelId="13" srcId="1" destId="11" srcOrd="0" destOrd="0"/>
-        <dgm:cxn modelId="14" srcId="1" destId="12" srcOrd="1" destOrd="0"/>
+        <dgm:cxn modelId="14" srcId="1" destId="12" srcOrd="0" destOrd="0"/>
         <dgm:cxn modelId="23" srcId="2" destId="21" srcOrd="0" destOrd="0"/>
-        <dgm:cxn modelId="24" srcId="2" destId="22" srcOrd="1" destOrd="0"/>
-        <dgm:cxn modelId="33" srcId="3" destId="31" srcOrd="0" destOrd="0"/>
-        <dgm:cxn modelId="34" srcId="3" destId="32" srcOrd="1" destOrd="0"/>
+        <dgm:cxn modelId="24" srcId="2" destId="22" srcOrd="0" destOrd="0"/>
       </dgm:cxnLst>
       <dgm:bg/>
       <dgm:whole/>
@@ -9296,9 +9120,11 @@
       <dgm:ptLst>
         <dgm:pt modelId="0" type="doc"/>
         <dgm:pt modelId="1"/>
+        <dgm:pt modelId="2"/>
       </dgm:ptLst>
       <dgm:cxnLst>
-        <dgm:cxn modelId="4" srcId="0" destId="1" srcOrd="0" destOrd="0"/>
+        <dgm:cxn modelId="3" srcId="0" destId="1" srcOrd="0" destOrd="0"/>
+        <dgm:cxn modelId="4" srcId="0" destId="2" srcOrd="1" destOrd="0"/>
       </dgm:cxnLst>
       <dgm:bg/>
       <dgm:whole/>
@@ -9309,180 +9135,141 @@
       <dgm:ptLst>
         <dgm:pt modelId="0" type="doc"/>
         <dgm:pt modelId="1"/>
-        <dgm:pt modelId="11"/>
         <dgm:pt modelId="2"/>
-        <dgm:pt modelId="21"/>
         <dgm:pt modelId="3"/>
-        <dgm:pt modelId="31"/>
         <dgm:pt modelId="4"/>
-        <dgm:pt modelId="41"/>
       </dgm:ptLst>
       <dgm:cxnLst>
         <dgm:cxn modelId="5" srcId="0" destId="1" srcOrd="0" destOrd="0"/>
         <dgm:cxn modelId="6" srcId="0" destId="2" srcOrd="1" destOrd="0"/>
         <dgm:cxn modelId="7" srcId="0" destId="3" srcOrd="2" destOrd="0"/>
         <dgm:cxn modelId="8" srcId="0" destId="4" srcOrd="3" destOrd="0"/>
-        <dgm:cxn modelId="13" srcId="1" destId="11" srcOrd="0" destOrd="0"/>
-        <dgm:cxn modelId="23" srcId="2" destId="21" srcOrd="0" destOrd="0"/>
-        <dgm:cxn modelId="33" srcId="3" destId="31" srcOrd="0" destOrd="0"/>
-        <dgm:cxn modelId="43" srcId="4" destId="41" srcOrd="0" destOrd="0"/>
       </dgm:cxnLst>
       <dgm:bg/>
       <dgm:whole/>
     </dgm:dataModel>
   </dgm:clrData>
-  <dgm:layoutNode name="linearFlow">
+  <dgm:layoutNode name="Name0">
     <dgm:varLst>
       <dgm:dir/>
       <dgm:animLvl val="lvl"/>
-      <dgm:resizeHandles val="exact"/>
+      <dgm:resizeHandles/>
     </dgm:varLst>
     <dgm:alg type="lin">
       <dgm:param type="linDir" val="fromT"/>
-      <dgm:param type="nodeHorzAlign" val="l"/>
     </dgm:alg>
     <dgm:shape xmlns:r="http://schemas.openxmlformats.org/officeDocument/2006/relationships" r:blip="">
       <dgm:adjLst/>
     </dgm:shape>
     <dgm:presOf/>
     <dgm:constrLst>
-      <dgm:constr type="h" for="ch" forName="composite" refType="h"/>
-      <dgm:constr type="w" for="ch" forName="composite" refType="w"/>
-      <dgm:constr type="h" for="des" forName="parentText" op="equ"/>
-      <dgm:constr type="h" for="ch" forName="sp" val="-14.88"/>
-      <dgm:constr type="h" for="ch" forName="sp" refType="w" refFor="des" refForName="parentText" op="gte" fact="-0.3"/>
-      <dgm:constr type="primFontSz" for="des" forName="parentText" op="equ" val="65"/>
-      <dgm:constr type="primFontSz" for="des" forName="descendantText" op="equ" val="65"/>
+      <dgm:constr type="w" for="ch" forName="linNode" refType="w"/>
+      <dgm:constr type="h" for="ch" forName="linNode" refType="h"/>
+      <dgm:constr type="h" for="ch" forName="spacing" refType="h" refFor="ch" refForName="linNode" fact="0.1"/>
+      <dgm:constr type="primFontSz" for="des" forName="parentShp" op="equ" val="65"/>
+      <dgm:constr type="primFontSz" for="des" forName="childShp" op="equ" val="65"/>
     </dgm:constrLst>
     <dgm:ruleLst/>
-    <dgm:forEach name="Name0" axis="ch" ptType="node">
-      <dgm:layoutNode name="composite">
-        <dgm:alg type="composite"/>
+    <dgm:forEach name="Name1" axis="ch" ptType="node">
+      <dgm:layoutNode name="linNode">
+        <dgm:choose name="Name2">
+          <dgm:if name="Name3" func="var" arg="dir" op="equ" val="norm">
+            <dgm:alg type="lin">
+              <dgm:param type="linDir" val="fromL"/>
+            </dgm:alg>
+          </dgm:if>
+          <dgm:else name="Name4">
+            <dgm:alg type="lin">
+              <dgm:param type="linDir" val="fromR"/>
+            </dgm:alg>
+          </dgm:else>
+        </dgm:choose>
         <dgm:shape xmlns:r="http://schemas.openxmlformats.org/officeDocument/2006/relationships" r:blip="">
           <dgm:adjLst/>
         </dgm:shape>
         <dgm:presOf/>
-        <dgm:choose name="Name1">
-          <dgm:if name="Name2" func="var" arg="dir" op="equ" val="norm">
+        <dgm:choose name="Name5">
+          <dgm:if name="Name6" func="var" arg="dir" op="equ" val="norm">
             <dgm:constrLst>
-              <dgm:constr type="t" for="ch" forName="parentText"/>
-              <dgm:constr type="l" for="ch" forName="parentText"/>
-              <dgm:constr type="w" for="ch" forName="parentText" refType="w" fact="0.4"/>
-              <dgm:constr type="h" for="ch" forName="parentText" refType="h"/>
-              <dgm:constr type="w" for="ch" forName="parentText" refType="w" op="lte" fact="0.5"/>
-              <dgm:constr type="w" for="ch" forName="parentText" refType="h" refFor="ch" refForName="parentText" op="lte" fact="0.7"/>
-              <dgm:constr type="h" for="ch" forName="parentText" refType="w" refFor="ch" refForName="parentText" op="lte" fact="3"/>
-              <dgm:constr type="l" for="ch" forName="descendantText" refType="w" refFor="ch" refForName="parentText"/>
-              <dgm:constr type="w" for="ch" forName="descendantText" refType="w"/>
-              <dgm:constr type="wOff" for="ch" forName="descendantText" refType="w" refFor="ch" refForName="parentText" fact="-1"/>
-              <dgm:constr type="t" for="ch" forName="descendantText"/>
-              <dgm:constr type="b" for="ch" forName="descendantText" refType="h" refFor="ch" refForName="parentText"/>
-              <dgm:constr type="bOff" for="ch" forName="descendantText" refType="w" refFor="ch" refForName="parentText" fact="-0.5"/>
+              <dgm:constr type="w" for="ch" forName="parentShp" refType="w" fact="0.4"/>
+              <dgm:constr type="h" for="ch" forName="parentShp" refType="h"/>
+              <dgm:constr type="w" for="ch" forName="childShp" refType="w" fact="0.6"/>
+              <dgm:constr type="h" for="ch" forName="childShp" refType="h" refFor="ch" refForName="parentShp"/>
             </dgm:constrLst>
           </dgm:if>
-          <dgm:else name="Name3">
+          <dgm:else name="Name7">
             <dgm:constrLst>
-              <dgm:constr type="t" for="ch" forName="parentText"/>
-              <dgm:constr type="r" for="ch" forName="parentText" refType="w"/>
-              <dgm:constr type="w" for="ch" forName="parentText" refType="w" fact="0.4"/>
-              <dgm:constr type="h" for="ch" forName="parentText" refType="h"/>
-              <dgm:constr type="w" for="ch" forName="parentText" refType="w" op="lte" fact="0.5"/>
-              <dgm:constr type="w" for="ch" forName="parentText" refType="h" refFor="ch" refForName="parentText" op="lte" fact="0.7"/>
-              <dgm:constr type="h" for="ch" forName="parentText" refType="w" refFor="ch" refForName="parentText" op="lte" fact="3"/>
-              <dgm:constr type="l" for="ch" forName="descendantText"/>
-              <dgm:constr type="w" for="ch" forName="descendantText" refType="w"/>
-              <dgm:constr type="wOff" for="ch" forName="descendantText" refType="w" refFor="ch" refForName="parentText" fact="-1"/>
-              <dgm:constr type="t" for="ch" forName="descendantText"/>
-              <dgm:constr type="b" for="ch" forName="descendantText" refType="h" refFor="ch" refForName="parentText"/>
-              <dgm:constr type="bOff" for="ch" forName="descendantText" refType="w" refFor="ch" refForName="parentText" fact="-0.5"/>
+              <dgm:constr type="w" for="ch" forName="parentShp" refType="w" fact="0.4"/>
+              <dgm:constr type="h" for="ch" forName="parentShp" refType="h"/>
+              <dgm:constr type="w" for="ch" forName="childShp" refType="w" fact="0.6"/>
+              <dgm:constr type="h" for="ch" forName="childShp" refType="h" refFor="ch" refForName="parentShp"/>
             </dgm:constrLst>
           </dgm:else>
         </dgm:choose>
         <dgm:ruleLst/>
-        <dgm:layoutNode name="parentText" styleLbl="alignNode1">
+        <dgm:layoutNode name="parentShp" styleLbl="node1">
           <dgm:varLst>
-            <dgm:chMax val="1"/>
             <dgm:bulletEnabled val="1"/>
           </dgm:varLst>
           <dgm:alg type="tx"/>
-          <dgm:shape xmlns:r="http://schemas.openxmlformats.org/officeDocument/2006/relationships" rot="90" type="chevron" r:blip="">
+          <dgm:shape xmlns:r="http://schemas.openxmlformats.org/officeDocument/2006/relationships" type="roundRect" r:blip="">
             <dgm:adjLst/>
           </dgm:shape>
           <dgm:presOf axis="self" ptType="node"/>
           <dgm:constrLst>
-            <dgm:constr type="lMarg" refType="primFontSz" fact="0.05"/>
-            <dgm:constr type="rMarg" refType="primFontSz" fact="0.05"/>
-            <dgm:constr type="tMarg" refType="primFontSz" fact="0.05"/>
-            <dgm:constr type="bMarg" refType="primFontSz" fact="0.05"/>
+            <dgm:constr type="tMarg" refType="primFontSz" fact="0.15"/>
+            <dgm:constr type="bMarg" refType="primFontSz" fact="0.15"/>
+            <dgm:constr type="lMarg" refType="primFontSz" fact="0.3"/>
+            <dgm:constr type="rMarg" refType="primFontSz" fact="0.3"/>
           </dgm:constrLst>
           <dgm:ruleLst>
-            <dgm:rule type="h" val="100" fact="NaN" max="NaN"/>
-            <dgm:rule type="primFontSz" val="24" fact="NaN" max="NaN"/>
-            <dgm:rule type="h" val="110" fact="NaN" max="NaN"/>
-            <dgm:rule type="primFontSz" val="18" fact="NaN" max="NaN"/>
-            <dgm:rule type="h" val="INF" fact="NaN" max="NaN"/>
             <dgm:rule type="primFontSz" val="5" fact="NaN" max="NaN"/>
           </dgm:ruleLst>
         </dgm:layoutNode>
-        <dgm:layoutNode name="descendantText" styleLbl="alignAcc1">
+        <dgm:layoutNode name="childShp" styleLbl="bgAccFollowNode1">
           <dgm:varLst>
             <dgm:bulletEnabled val="1"/>
           </dgm:varLst>
-          <dgm:choose name="Name4">
-            <dgm:if name="Name5" func="var" arg="dir" op="equ" val="norm">
-              <dgm:alg type="tx">
-                <dgm:param type="stBulletLvl" val="1"/>
-                <dgm:param type="txAnchorVertCh" val="mid"/>
-              </dgm:alg>
-              <dgm:shape xmlns:r="http://schemas.openxmlformats.org/officeDocument/2006/relationships" rot="90" type="round2SameRect" r:blip="">
-                <dgm:adjLst/>
+          <dgm:alg type="tx">
+            <dgm:param type="stBulletLvl" val="1"/>
+          </dgm:alg>
+          <dgm:choose name="Name8">
+            <dgm:if name="Name9" func="var" arg="dir" op="equ" val="norm">
+              <dgm:shape xmlns:r="http://schemas.openxmlformats.org/officeDocument/2006/relationships" type="rightArrow" r:blip="" zOrderOff="-2">
+                <dgm:adjLst>
+                  <dgm:adj idx="1" val="0.75"/>
+                </dgm:adjLst>
               </dgm:shape>
             </dgm:if>
-            <dgm:else name="Name6">
-              <dgm:alg type="tx">
-                <dgm:param type="stBulletLvl" val="1"/>
-                <dgm:param type="txAnchorVertCh" val="mid"/>
-              </dgm:alg>
-              <dgm:shape xmlns:r="http://schemas.openxmlformats.org/officeDocument/2006/relationships" rot="-90" type="round2SameRect" r:blip="">
-                <dgm:adjLst/>
+            <dgm:else name="Name10">
+              <dgm:shape xmlns:r="http://schemas.openxmlformats.org/officeDocument/2006/relationships" rot="180" type="rightArrow" r:blip="" zOrderOff="-2">
+                <dgm:adjLst>
+                  <dgm:adj idx="1" val="0.75"/>
+                </dgm:adjLst>
               </dgm:shape>
             </dgm:else>
           </dgm:choose>
           <dgm:presOf axis="des" ptType="node"/>
-          <dgm:choose name="Name7">
-            <dgm:if name="Name8" func="var" arg="dir" op="equ" val="norm">
-              <dgm:constrLst>
-                <dgm:constr type="secFontSz" refType="primFontSz"/>
-                <dgm:constr type="tMarg" refType="primFontSz" fact="0.05"/>
-                <dgm:constr type="bMarg" refType="primFontSz" fact="0.05"/>
-                <dgm:constr type="rMarg" refType="primFontSz" fact="0.05"/>
-              </dgm:constrLst>
-            </dgm:if>
-            <dgm:else name="Name9">
-              <dgm:constrLst>
-                <dgm:constr type="secFontSz" refType="primFontSz"/>
-                <dgm:constr type="tMarg" refType="primFontSz" fact="0.05"/>
-                <dgm:constr type="bMarg" refType="primFontSz" fact="0.05"/>
-                <dgm:constr type="lMarg" refType="primFontSz" fact="0.05"/>
-              </dgm:constrLst>
-            </dgm:else>
-          </dgm:choose>
+          <dgm:constrLst>
+            <dgm:constr type="secFontSz" refType="primFontSz"/>
+            <dgm:constr type="tMarg" refType="primFontSz" fact="0.05"/>
+            <dgm:constr type="bMarg" refType="primFontSz" fact="0.05"/>
+            <dgm:constr type="lMarg" refType="primFontSz" fact="0.05"/>
+            <dgm:constr type="rMarg" refType="primFontSz" fact="0.05"/>
+          </dgm:constrLst>
           <dgm:ruleLst>
             <dgm:rule type="primFontSz" val="5" fact="NaN" max="NaN"/>
           </dgm:ruleLst>
         </dgm:layoutNode>
       </dgm:layoutNode>
-      <dgm:forEach name="Name10" axis="followSib" ptType="sibTrans" cnt="1">
-        <dgm:layoutNode name="sp">
+      <dgm:forEach name="Name11" axis="followSib" ptType="sibTrans" cnt="1">
+        <dgm:layoutNode name="spacing">
           <dgm:alg type="sp"/>
           <dgm:shape xmlns:r="http://schemas.openxmlformats.org/officeDocument/2006/relationships" r:blip="">
             <dgm:adjLst/>
           </dgm:shape>
-          <dgm:presOf axis="self"/>
-          <dgm:constrLst>
-            <dgm:constr type="w" val="1"/>
-            <dgm:constr type="h" val="37.5"/>
-          </dgm:constrLst>
+          <dgm:presOf/>
+          <dgm:constrLst/>
           <dgm:ruleLst/>
         </dgm:layoutNode>
       </dgm:forEach>
@@ -14910,7 +14697,7 @@
           <a:p>
             <a:fld id="{F09497FB-3453-4226-8953-5479DA0EE8DF}" type="datetimeFigureOut">
               <a:rPr lang="en-US" smtClean="0"/>
-              <a:t>3/13/2018</a:t>
+              <a:t>3/15/2018</a:t>
             </a:fld>
             <a:endParaRPr lang="en-US"/>
           </a:p>
@@ -15401,7 +15188,7 @@
           <a:p>
             <a:fld id="{7374D69A-1842-4B4A-A2D0-729A8043D63C}" type="slidenum">
               <a:rPr lang="en-US" smtClean="0"/>
-              <a:t>2</a:t>
+              <a:t>3</a:t>
             </a:fld>
             <a:endParaRPr lang="en-US"/>
           </a:p>
@@ -15466,37 +15253,8 @@
           <a:p>
             <a:r>
               <a:rPr lang="en-US" dirty="0"/>
-              <a:t>Describe the exploration and cleanup process</a:t>
+              <a:t>We set out to answer 9 questions related to stories, languages and categories.</a:t>
             </a:r>
-          </a:p>
-          <a:p>
-            <a:r>
-              <a:rPr lang="en-US" dirty="0"/>
-              <a:t>Discuss insights you had while exploring the data that you didn't anticipate</a:t>
-            </a:r>
-          </a:p>
-          <a:p>
-            <a:r>
-              <a:rPr lang="en-US" dirty="0"/>
-              <a:t>Discuss any problems that arose after exploring the data, and how you resolved them</a:t>
-            </a:r>
-          </a:p>
-          <a:p>
-            <a:r>
-              <a:rPr lang="en-US" dirty="0"/>
-              <a:t>Present and discuss interesting figures developed during exploration, ideally with the help of </a:t>
-            </a:r>
-            <a:r>
-              <a:rPr lang="en-US" dirty="0" err="1"/>
-              <a:t>Jupyter</a:t>
-            </a:r>
-            <a:r>
-              <a:rPr lang="en-US" dirty="0"/>
-              <a:t> Notebook</a:t>
-            </a:r>
-          </a:p>
-          <a:p>
-            <a:endParaRPr lang="en-US" dirty="0"/>
           </a:p>
         </p:txBody>
       </p:sp>
@@ -15526,7 +15284,7 @@
     </p:spTree>
     <p:extLst>
       <p:ext uri="{BB962C8B-B14F-4D97-AF65-F5344CB8AC3E}">
-        <p14:creationId xmlns:p14="http://schemas.microsoft.com/office/powerpoint/2010/main" val="3650904253"/>
+        <p14:creationId xmlns:p14="http://schemas.microsoft.com/office/powerpoint/2010/main" val="510132832"/>
       </p:ext>
     </p:extLst>
   </p:cSld>
@@ -15642,7 +15400,7 @@
     </p:spTree>
     <p:extLst>
       <p:ext uri="{BB962C8B-B14F-4D97-AF65-F5344CB8AC3E}">
-        <p14:creationId xmlns:p14="http://schemas.microsoft.com/office/powerpoint/2010/main" val="700736003"/>
+        <p14:creationId xmlns:p14="http://schemas.microsoft.com/office/powerpoint/2010/main" val="3650904253"/>
       </p:ext>
     </p:extLst>
   </p:cSld>
@@ -15696,6 +15454,38 @@
           <a:bodyPr/>
           <a:lstStyle/>
           <a:p>
+            <a:r>
+              <a:rPr lang="en-US" dirty="0"/>
+              <a:t>Describe the exploration and cleanup process</a:t>
+            </a:r>
+          </a:p>
+          <a:p>
+            <a:r>
+              <a:rPr lang="en-US" dirty="0"/>
+              <a:t>Discuss insights you had while exploring the data that you didn't anticipate</a:t>
+            </a:r>
+          </a:p>
+          <a:p>
+            <a:r>
+              <a:rPr lang="en-US" dirty="0"/>
+              <a:t>Discuss any problems that arose after exploring the data, and how you resolved them</a:t>
+            </a:r>
+          </a:p>
+          <a:p>
+            <a:r>
+              <a:rPr lang="en-US" dirty="0"/>
+              <a:t>Present and discuss interesting figures developed during exploration, ideally with the help of </a:t>
+            </a:r>
+            <a:r>
+              <a:rPr lang="en-US" dirty="0" err="1"/>
+              <a:t>Jupyter</a:t>
+            </a:r>
+            <a:r>
+              <a:rPr lang="en-US" dirty="0"/>
+              <a:t> Notebook</a:t>
+            </a:r>
+          </a:p>
+          <a:p>
             <a:endParaRPr lang="en-US" dirty="0"/>
           </a:p>
         </p:txBody>
@@ -15717,7 +15507,7 @@
           <a:p>
             <a:fld id="{7374D69A-1842-4B4A-A2D0-729A8043D63C}" type="slidenum">
               <a:rPr lang="en-US" smtClean="0"/>
-              <a:t>7</a:t>
+              <a:t>6</a:t>
             </a:fld>
             <a:endParaRPr lang="en-US"/>
           </a:p>
@@ -15726,7 +15516,7 @@
     </p:spTree>
     <p:extLst>
       <p:ext uri="{BB962C8B-B14F-4D97-AF65-F5344CB8AC3E}">
-        <p14:creationId xmlns:p14="http://schemas.microsoft.com/office/powerpoint/2010/main" val="3824826512"/>
+        <p14:creationId xmlns:p14="http://schemas.microsoft.com/office/powerpoint/2010/main" val="700736003"/>
       </p:ext>
     </p:extLst>
   </p:cSld>
@@ -15810,6 +15600,90 @@
     </p:spTree>
     <p:extLst>
       <p:ext uri="{BB962C8B-B14F-4D97-AF65-F5344CB8AC3E}">
+        <p14:creationId xmlns:p14="http://schemas.microsoft.com/office/powerpoint/2010/main" val="3824826512"/>
+      </p:ext>
+    </p:extLst>
+  </p:cSld>
+  <p:clrMapOvr>
+    <a:masterClrMapping/>
+  </p:clrMapOvr>
+</p:notes>
+</file>
+
+<file path=ppt/notesSlides/notesSlide6.xml><?xml version="1.0" encoding="utf-8"?>
+<p:notes xmlns:a="http://schemas.openxmlformats.org/drawingml/2006/main" xmlns:r="http://schemas.openxmlformats.org/officeDocument/2006/relationships" xmlns:p="http://schemas.openxmlformats.org/presentationml/2006/main">
+  <p:cSld>
+    <p:spTree>
+      <p:nvGrpSpPr>
+        <p:cNvPr id="1" name=""/>
+        <p:cNvGrpSpPr/>
+        <p:nvPr/>
+      </p:nvGrpSpPr>
+      <p:grpSpPr>
+        <a:xfrm>
+          <a:off x="0" y="0"/>
+          <a:ext cx="0" cy="0"/>
+          <a:chOff x="0" y="0"/>
+          <a:chExt cx="0" cy="0"/>
+        </a:xfrm>
+      </p:grpSpPr>
+      <p:sp>
+        <p:nvSpPr>
+          <p:cNvPr id="2" name="Slide Image Placeholder 1"/>
+          <p:cNvSpPr>
+            <a:spLocks noGrp="1" noRot="1" noChangeAspect="1"/>
+          </p:cNvSpPr>
+          <p:nvPr>
+            <p:ph type="sldImg"/>
+          </p:nvPr>
+        </p:nvSpPr>
+        <p:spPr/>
+      </p:sp>
+      <p:sp>
+        <p:nvSpPr>
+          <p:cNvPr id="3" name="Notes Placeholder 2"/>
+          <p:cNvSpPr>
+            <a:spLocks noGrp="1"/>
+          </p:cNvSpPr>
+          <p:nvPr>
+            <p:ph type="body" idx="1"/>
+          </p:nvPr>
+        </p:nvSpPr>
+        <p:spPr/>
+        <p:txBody>
+          <a:bodyPr/>
+          <a:lstStyle/>
+          <a:p>
+            <a:endParaRPr lang="en-US" dirty="0"/>
+          </a:p>
+        </p:txBody>
+      </p:sp>
+      <p:sp>
+        <p:nvSpPr>
+          <p:cNvPr id="4" name="Slide Number Placeholder 3"/>
+          <p:cNvSpPr>
+            <a:spLocks noGrp="1"/>
+          </p:cNvSpPr>
+          <p:nvPr>
+            <p:ph type="sldNum" sz="quarter" idx="10"/>
+          </p:nvPr>
+        </p:nvSpPr>
+        <p:spPr/>
+        <p:txBody>
+          <a:bodyPr/>
+          <a:lstStyle/>
+          <a:p>
+            <a:fld id="{7374D69A-1842-4B4A-A2D0-729A8043D63C}" type="slidenum">
+              <a:rPr lang="en-US" smtClean="0"/>
+              <a:t>9</a:t>
+            </a:fld>
+            <a:endParaRPr lang="en-US"/>
+          </a:p>
+        </p:txBody>
+      </p:sp>
+    </p:spTree>
+    <p:extLst>
+      <p:ext uri="{BB962C8B-B14F-4D97-AF65-F5344CB8AC3E}">
         <p14:creationId xmlns:p14="http://schemas.microsoft.com/office/powerpoint/2010/main" val="1371019719"/>
       </p:ext>
     </p:extLst>
@@ -15820,7 +15694,7 @@
 </p:notes>
 </file>
 
-<file path=ppt/notesSlides/notesSlide6.xml><?xml version="1.0" encoding="utf-8"?>
+<file path=ppt/notesSlides/notesSlide7.xml><?xml version="1.0" encoding="utf-8"?>
 <p:notes xmlns:a="http://schemas.openxmlformats.org/drawingml/2006/main" xmlns:r="http://schemas.openxmlformats.org/officeDocument/2006/relationships" xmlns:p="http://schemas.openxmlformats.org/presentationml/2006/main">
   <p:cSld>
     <p:spTree>
@@ -15908,7 +15782,7 @@
           <a:p>
             <a:fld id="{7374D69A-1842-4B4A-A2D0-729A8043D63C}" type="slidenum">
               <a:rPr lang="en-US" smtClean="0"/>
-              <a:t>10</a:t>
+              <a:t>11</a:t>
             </a:fld>
             <a:endParaRPr lang="en-US"/>
           </a:p>
@@ -16127,7 +16001,7 @@
           <a:p>
             <a:fld id="{534280B5-DAB8-4122-A2BF-8E3B4D97F156}" type="datetime1">
               <a:rPr lang="en-US" smtClean="0"/>
-              <a:t>3/13/2018</a:t>
+              <a:t>3/15/2018</a:t>
             </a:fld>
             <a:endParaRPr lang="en-US"/>
           </a:p>
@@ -16320,7 +16194,7 @@
           <a:p>
             <a:fld id="{090EA9C5-4B89-48FE-9F5A-77A8FC13FFC0}" type="datetime1">
               <a:rPr lang="en-US" smtClean="0"/>
-              <a:t>3/13/2018</a:t>
+              <a:t>3/15/2018</a:t>
             </a:fld>
             <a:endParaRPr lang="en-US"/>
           </a:p>
@@ -16503,7 +16377,7 @@
           <a:p>
             <a:fld id="{0460DCC1-E266-4546-A3B3-9B9DA52575BD}" type="datetime1">
               <a:rPr lang="en-US" smtClean="0"/>
-              <a:t>3/13/2018</a:t>
+              <a:t>3/15/2018</a:t>
             </a:fld>
             <a:endParaRPr lang="en-US"/>
           </a:p>
@@ -16676,7 +16550,7 @@
           <a:p>
             <a:fld id="{50E87220-2BA9-4F79-BE2A-015E85F5DED7}" type="datetime1">
               <a:rPr lang="en-US" smtClean="0"/>
-              <a:t>3/13/2018</a:t>
+              <a:t>3/15/2018</a:t>
             </a:fld>
             <a:endParaRPr lang="en-US"/>
           </a:p>
@@ -16935,7 +16809,7 @@
           <a:p>
             <a:fld id="{D7A3A64B-E8DB-423D-9487-3AC58993C762}" type="datetime1">
               <a:rPr lang="en-US" smtClean="0"/>
-              <a:t>3/13/2018</a:t>
+              <a:t>3/15/2018</a:t>
             </a:fld>
             <a:endParaRPr lang="en-US"/>
           </a:p>
@@ -17226,7 +17100,7 @@
           <a:p>
             <a:fld id="{C4CFC941-9496-4D3D-A785-0873BFF6757A}" type="datetime1">
               <a:rPr lang="en-US" smtClean="0"/>
-              <a:t>3/13/2018</a:t>
+              <a:t>3/15/2018</a:t>
             </a:fld>
             <a:endParaRPr lang="en-US"/>
           </a:p>
@@ -17667,7 +17541,7 @@
           <a:p>
             <a:fld id="{C5484F68-FC4A-4B25-BD83-30FD7C23EAD2}" type="datetime1">
               <a:rPr lang="en-US" smtClean="0"/>
-              <a:t>3/13/2018</a:t>
+              <a:t>3/15/2018</a:t>
             </a:fld>
             <a:endParaRPr lang="en-US"/>
           </a:p>
@@ -17788,7 +17662,7 @@
           <a:p>
             <a:fld id="{7D18015E-D067-463F-8E5F-DE70F652035E}" type="datetime1">
               <a:rPr lang="en-US" smtClean="0"/>
-              <a:t>3/13/2018</a:t>
+              <a:t>3/15/2018</a:t>
             </a:fld>
             <a:endParaRPr lang="en-US"/>
           </a:p>
@@ -17886,7 +17760,7 @@
           <a:p>
             <a:fld id="{49FC611A-9076-4C0D-846A-19B2B9053219}" type="datetime1">
               <a:rPr lang="en-US" smtClean="0"/>
-              <a:t>3/13/2018</a:t>
+              <a:t>3/15/2018</a:t>
             </a:fld>
             <a:endParaRPr lang="en-US"/>
           </a:p>
@@ -18245,7 +18119,7 @@
           <a:p>
             <a:fld id="{2226986F-B5E3-4F43-9091-4824EB0C515D}" type="datetime1">
               <a:rPr lang="en-US" smtClean="0"/>
-              <a:t>3/13/2018</a:t>
+              <a:t>3/15/2018</a:t>
             </a:fld>
             <a:endParaRPr lang="en-US"/>
           </a:p>
@@ -18567,7 +18441,7 @@
           <a:p>
             <a:fld id="{39F3C355-D01D-4027-AC43-3F550774DC58}" type="datetime1">
               <a:rPr lang="en-US" smtClean="0"/>
-              <a:t>3/13/2018</a:t>
+              <a:t>3/15/2018</a:t>
             </a:fld>
             <a:endParaRPr lang="en-US"/>
           </a:p>
@@ -18803,7 +18677,7 @@
           <a:p>
             <a:fld id="{E41391E7-4CD0-4F99-B13E-7E3251F2552B}" type="datetime1">
               <a:rPr lang="en-US" smtClean="0"/>
-              <a:t>3/13/2018</a:t>
+              <a:t>3/15/2018</a:t>
             </a:fld>
             <a:endParaRPr lang="en-US"/>
           </a:p>
@@ -19262,15 +19136,7 @@
           <a:p>
             <a:r>
               <a:rPr lang="en-US" dirty="0"/>
-              <a:t>Investigation of </a:t>
-            </a:r>
-            <a:r>
-              <a:rPr lang="en-US" dirty="0" err="1"/>
-              <a:t>wattpad</a:t>
-            </a:r>
-            <a:r>
-              <a:rPr lang="en-US" dirty="0"/>
-              <a:t> stories</a:t>
+              <a:t>Investigation of Wattpad stories</a:t>
             </a:r>
           </a:p>
         </p:txBody>
@@ -19392,6 +19258,248 @@
           <p:cNvPr id="2" name="Title 1">
             <a:extLst>
               <a:ext uri="{FF2B5EF4-FFF2-40B4-BE49-F238E27FC236}">
+                <a16:creationId xmlns:a16="http://schemas.microsoft.com/office/drawing/2014/main" id="{CBB67211-7222-4824-8A16-800B1CF60E4D}"/>
+              </a:ext>
+            </a:extLst>
+          </p:cNvPr>
+          <p:cNvSpPr>
+            <a:spLocks noGrp="1"/>
+          </p:cNvSpPr>
+          <p:nvPr>
+            <p:ph type="title"/>
+          </p:nvPr>
+        </p:nvSpPr>
+        <p:spPr/>
+        <p:txBody>
+          <a:bodyPr anchor="t"/>
+          <a:lstStyle/>
+          <a:p>
+            <a:r>
+              <a:rPr lang="en-US" dirty="0"/>
+              <a:t>Story Ratings</a:t>
+            </a:r>
+          </a:p>
+        </p:txBody>
+      </p:sp>
+      <p:sp>
+        <p:nvSpPr>
+          <p:cNvPr id="3" name="Footer Placeholder 2">
+            <a:extLst>
+              <a:ext uri="{FF2B5EF4-FFF2-40B4-BE49-F238E27FC236}">
+                <a16:creationId xmlns:a16="http://schemas.microsoft.com/office/drawing/2014/main" id="{A8DFC824-3571-469A-8F8B-60EAD2C772DB}"/>
+              </a:ext>
+            </a:extLst>
+          </p:cNvPr>
+          <p:cNvSpPr>
+            <a:spLocks noGrp="1"/>
+          </p:cNvSpPr>
+          <p:nvPr>
+            <p:ph type="ftr" sz="quarter" idx="11"/>
+          </p:nvPr>
+        </p:nvSpPr>
+        <p:spPr/>
+        <p:txBody>
+          <a:bodyPr/>
+          <a:lstStyle/>
+          <a:p>
+            <a:r>
+              <a:rPr lang="en-US"/>
+              <a:t>UTDataJan Tues/Thurs Team3</a:t>
+            </a:r>
+          </a:p>
+        </p:txBody>
+      </p:sp>
+      <p:sp>
+        <p:nvSpPr>
+          <p:cNvPr id="8" name="Slide Number Placeholder 7">
+            <a:extLst>
+              <a:ext uri="{FF2B5EF4-FFF2-40B4-BE49-F238E27FC236}">
+                <a16:creationId xmlns:a16="http://schemas.microsoft.com/office/drawing/2014/main" id="{A8F804FB-BE7D-4872-8227-E1DBE36AEF4A}"/>
+              </a:ext>
+            </a:extLst>
+          </p:cNvPr>
+          <p:cNvSpPr>
+            <a:spLocks noGrp="1"/>
+          </p:cNvSpPr>
+          <p:nvPr>
+            <p:ph type="sldNum" sz="quarter" idx="12"/>
+          </p:nvPr>
+        </p:nvSpPr>
+        <p:spPr/>
+        <p:txBody>
+          <a:bodyPr/>
+          <a:lstStyle/>
+          <a:p>
+            <a:fld id="{64D12EC4-2D04-0A4F-A74B-758ED03DD9F6}" type="slidenum">
+              <a:rPr lang="en-US" smtClean="0"/>
+              <a:t>10</a:t>
+            </a:fld>
+            <a:endParaRPr lang="en-US"/>
+          </a:p>
+        </p:txBody>
+      </p:sp>
+      <p:sp>
+        <p:nvSpPr>
+          <p:cNvPr id="7" name="TextBox 6">
+            <a:extLst>
+              <a:ext uri="{FF2B5EF4-FFF2-40B4-BE49-F238E27FC236}">
+                <a16:creationId xmlns:a16="http://schemas.microsoft.com/office/drawing/2014/main" id="{CDA3CEA4-0A37-4979-8625-AF47DFCE0CDD}"/>
+              </a:ext>
+            </a:extLst>
+          </p:cNvPr>
+          <p:cNvSpPr txBox="1"/>
+          <p:nvPr/>
+        </p:nvSpPr>
+        <p:spPr>
+          <a:xfrm>
+            <a:off x="1519797" y="5291092"/>
+            <a:ext cx="6329780" cy="646331"/>
+          </a:xfrm>
+          <a:prstGeom prst="rect">
+            <a:avLst/>
+          </a:prstGeom>
+          <a:solidFill>
+            <a:schemeClr val="accent1"/>
+          </a:solidFill>
+        </p:spPr>
+        <p:txBody>
+          <a:bodyPr wrap="square" rtlCol="0">
+            <a:spAutoFit/>
+          </a:bodyPr>
+          <a:lstStyle/>
+          <a:p>
+            <a:r>
+              <a:rPr lang="en-US">
+                <a:solidFill>
+                  <a:schemeClr val="bg1"/>
+                </a:solidFill>
+              </a:rPr>
+              <a:t>Indication </a:t>
+            </a:r>
+            <a:r>
+              <a:rPr lang="en-US" dirty="0">
+                <a:solidFill>
+                  <a:schemeClr val="bg1"/>
+                </a:solidFill>
+              </a:rPr>
+              <a:t>that dataset is pulling most recent records, as the majority of stories are rated low</a:t>
+            </a:r>
+          </a:p>
+        </p:txBody>
+      </p:sp>
+      <p:pic>
+        <p:nvPicPr>
+          <p:cNvPr id="9" name="Picture 8">
+            <a:extLst>
+              <a:ext uri="{FF2B5EF4-FFF2-40B4-BE49-F238E27FC236}">
+                <a16:creationId xmlns:a16="http://schemas.microsoft.com/office/drawing/2014/main" id="{8ABDA9DA-6A3A-403E-B6B9-3816D3D5048E}"/>
+              </a:ext>
+            </a:extLst>
+          </p:cNvPr>
+          <p:cNvPicPr>
+            <a:picLocks noChangeAspect="1"/>
+          </p:cNvPicPr>
+          <p:nvPr/>
+        </p:nvPicPr>
+        <p:blipFill>
+          <a:blip r:embed="rId2"/>
+          <a:stretch>
+            <a:fillRect/>
+          </a:stretch>
+        </p:blipFill>
+        <p:spPr>
+          <a:xfrm>
+            <a:off x="514350" y="1559473"/>
+            <a:ext cx="4259453" cy="3407562"/>
+          </a:xfrm>
+          <a:prstGeom prst="rect">
+            <a:avLst/>
+          </a:prstGeom>
+          <a:ln>
+            <a:solidFill>
+              <a:schemeClr val="accent1">
+                <a:hueOff val="0"/>
+                <a:satOff val="0"/>
+                <a:lumOff val="0"/>
+              </a:schemeClr>
+            </a:solidFill>
+          </a:ln>
+        </p:spPr>
+      </p:pic>
+      <p:pic>
+        <p:nvPicPr>
+          <p:cNvPr id="11" name="Picture 10">
+            <a:extLst>
+              <a:ext uri="{FF2B5EF4-FFF2-40B4-BE49-F238E27FC236}">
+                <a16:creationId xmlns:a16="http://schemas.microsoft.com/office/drawing/2014/main" id="{FDFEE32F-76A5-4E59-8264-1E61283D18CD}"/>
+              </a:ext>
+            </a:extLst>
+          </p:cNvPr>
+          <p:cNvPicPr>
+            <a:picLocks noChangeAspect="1"/>
+          </p:cNvPicPr>
+          <p:nvPr/>
+        </p:nvPicPr>
+        <p:blipFill>
+          <a:blip r:embed="rId3"/>
+          <a:stretch>
+            <a:fillRect/>
+          </a:stretch>
+        </p:blipFill>
+        <p:spPr>
+          <a:xfrm>
+            <a:off x="4684687" y="1559473"/>
+            <a:ext cx="4327864" cy="3462291"/>
+          </a:xfrm>
+          <a:prstGeom prst="rect">
+            <a:avLst/>
+          </a:prstGeom>
+          <a:ln>
+            <a:solidFill>
+              <a:schemeClr val="accent1">
+                <a:hueOff val="0"/>
+                <a:satOff val="0"/>
+                <a:lumOff val="0"/>
+              </a:schemeClr>
+            </a:solidFill>
+          </a:ln>
+        </p:spPr>
+      </p:pic>
+    </p:spTree>
+    <p:extLst>
+      <p:ext uri="{BB962C8B-B14F-4D97-AF65-F5344CB8AC3E}">
+        <p14:creationId xmlns:p14="http://schemas.microsoft.com/office/powerpoint/2010/main" val="3415291721"/>
+      </p:ext>
+    </p:extLst>
+  </p:cSld>
+  <p:clrMapOvr>
+    <a:masterClrMapping/>
+  </p:clrMapOvr>
+</p:sld>
+</file>
+
+<file path=ppt/slides/slide11.xml><?xml version="1.0" encoding="utf-8"?>
+<p:sld xmlns:a="http://schemas.openxmlformats.org/drawingml/2006/main" xmlns:r="http://schemas.openxmlformats.org/officeDocument/2006/relationships" xmlns:p="http://schemas.openxmlformats.org/presentationml/2006/main">
+  <p:cSld>
+    <p:spTree>
+      <p:nvGrpSpPr>
+        <p:cNvPr id="1" name=""/>
+        <p:cNvGrpSpPr/>
+        <p:nvPr/>
+      </p:nvGrpSpPr>
+      <p:grpSpPr>
+        <a:xfrm>
+          <a:off x="0" y="0"/>
+          <a:ext cx="0" cy="0"/>
+          <a:chOff x="0" y="0"/>
+          <a:chExt cx="0" cy="0"/>
+        </a:xfrm>
+      </p:grpSpPr>
+      <p:sp>
+        <p:nvSpPr>
+          <p:cNvPr id="2" name="Title 1">
+            <a:extLst>
+              <a:ext uri="{FF2B5EF4-FFF2-40B4-BE49-F238E27FC236}">
                 <a16:creationId xmlns:a16="http://schemas.microsoft.com/office/drawing/2014/main" id="{0FBD85DC-EE15-4B84-BE85-5D5AEB4E5D33}"/>
               </a:ext>
             </a:extLst>
@@ -19436,10 +19544,10 @@
           <a:bodyPr/>
           <a:lstStyle/>
           <a:p>
-            <a:r>
-              <a:rPr lang="en-US" dirty="0"/>
-              <a:t>Discuss your findings. Did you find what you expected to find? If not, why not? What inferences or general conclusions can you draw from your analysis?</a:t>
-            </a:r>
+            <a:pPr marL="0" indent="0">
+              <a:buNone/>
+            </a:pPr>
+            <a:endParaRPr lang="en-US" dirty="0"/>
           </a:p>
           <a:p>
             <a:endParaRPr lang="en-US" dirty="0"/>
@@ -19497,7 +19605,7 @@
           <a:p>
             <a:fld id="{64D12EC4-2D04-0A4F-A74B-758ED03DD9F6}" type="slidenum">
               <a:rPr lang="en-US" smtClean="0"/>
-              <a:t>10</a:t>
+              <a:t>11</a:t>
             </a:fld>
             <a:endParaRPr lang="en-US"/>
           </a:p>
@@ -19516,7 +19624,7 @@
 </p:sld>
 </file>
 
-<file path=ppt/slides/slide11.xml><?xml version="1.0" encoding="utf-8"?>
+<file path=ppt/slides/slide12.xml><?xml version="1.0" encoding="utf-8"?>
 <p:sld xmlns:a="http://schemas.openxmlformats.org/drawingml/2006/main" xmlns:r="http://schemas.openxmlformats.org/officeDocument/2006/relationships" xmlns:p="http://schemas.openxmlformats.org/presentationml/2006/main">
   <p:cSld>
     <p:spTree>
@@ -19640,7 +19748,7 @@
           <a:p>
             <a:fld id="{64D12EC4-2D04-0A4F-A74B-758ED03DD9F6}" type="slidenum">
               <a:rPr lang="en-US" smtClean="0"/>
-              <a:t>11</a:t>
+              <a:t>12</a:t>
             </a:fld>
             <a:endParaRPr lang="en-US"/>
           </a:p>
@@ -19659,7 +19767,7 @@
 </p:sld>
 </file>
 
-<file path=ppt/slides/slide12.xml><?xml version="1.0" encoding="utf-8"?>
+<file path=ppt/slides/slide13.xml><?xml version="1.0" encoding="utf-8"?>
 <p:sld xmlns:a="http://schemas.openxmlformats.org/drawingml/2006/main" xmlns:r="http://schemas.openxmlformats.org/officeDocument/2006/relationships" xmlns:p="http://schemas.openxmlformats.org/presentationml/2006/main">
   <p:cSld>
     <p:spTree>
@@ -19761,6 +19869,224 @@
       </p:grpSpPr>
       <p:sp>
         <p:nvSpPr>
+          <p:cNvPr id="2" name="Footer Placeholder 1">
+            <a:extLst>
+              <a:ext uri="{FF2B5EF4-FFF2-40B4-BE49-F238E27FC236}">
+                <a16:creationId xmlns:a16="http://schemas.microsoft.com/office/drawing/2014/main" id="{3CB0DB29-7307-45B2-93CD-13322BC9042A}"/>
+              </a:ext>
+            </a:extLst>
+          </p:cNvPr>
+          <p:cNvSpPr>
+            <a:spLocks noGrp="1"/>
+          </p:cNvSpPr>
+          <p:nvPr>
+            <p:ph type="ftr" sz="quarter" idx="11"/>
+          </p:nvPr>
+        </p:nvSpPr>
+        <p:spPr/>
+        <p:txBody>
+          <a:bodyPr/>
+          <a:lstStyle/>
+          <a:p>
+            <a:r>
+              <a:rPr lang="en-US"/>
+              <a:t>UTDataJan Tues/Thurs Team3</a:t>
+            </a:r>
+          </a:p>
+        </p:txBody>
+      </p:sp>
+      <p:sp>
+        <p:nvSpPr>
+          <p:cNvPr id="3" name="Slide Number Placeholder 2">
+            <a:extLst>
+              <a:ext uri="{FF2B5EF4-FFF2-40B4-BE49-F238E27FC236}">
+                <a16:creationId xmlns:a16="http://schemas.microsoft.com/office/drawing/2014/main" id="{FE44AB65-CEB8-43A7-A2CF-9198E360A395}"/>
+              </a:ext>
+            </a:extLst>
+          </p:cNvPr>
+          <p:cNvSpPr>
+            <a:spLocks noGrp="1"/>
+          </p:cNvSpPr>
+          <p:nvPr>
+            <p:ph type="sldNum" sz="quarter" idx="12"/>
+          </p:nvPr>
+        </p:nvSpPr>
+        <p:spPr/>
+        <p:txBody>
+          <a:bodyPr/>
+          <a:lstStyle/>
+          <a:p>
+            <a:fld id="{64D12EC4-2D04-0A4F-A74B-758ED03DD9F6}" type="slidenum">
+              <a:rPr lang="en-US" smtClean="0"/>
+              <a:t>2</a:t>
+            </a:fld>
+            <a:endParaRPr lang="en-US" dirty="0"/>
+          </a:p>
+        </p:txBody>
+      </p:sp>
+      <p:pic>
+        <p:nvPicPr>
+          <p:cNvPr id="5" name="Picture 4">
+            <a:extLst>
+              <a:ext uri="{FF2B5EF4-FFF2-40B4-BE49-F238E27FC236}">
+                <a16:creationId xmlns:a16="http://schemas.microsoft.com/office/drawing/2014/main" id="{3536C819-B101-4783-B04E-D48383674CD0}"/>
+              </a:ext>
+            </a:extLst>
+          </p:cNvPr>
+          <p:cNvPicPr>
+            <a:picLocks noChangeAspect="1"/>
+          </p:cNvPicPr>
+          <p:nvPr/>
+        </p:nvPicPr>
+        <p:blipFill>
+          <a:blip r:embed="rId2"/>
+          <a:stretch>
+            <a:fillRect/>
+          </a:stretch>
+        </p:blipFill>
+        <p:spPr>
+          <a:xfrm>
+            <a:off x="1908107" y="539137"/>
+            <a:ext cx="5613947" cy="3942416"/>
+          </a:xfrm>
+          <a:prstGeom prst="rect">
+            <a:avLst/>
+          </a:prstGeom>
+        </p:spPr>
+      </p:pic>
+      <p:pic>
+        <p:nvPicPr>
+          <p:cNvPr id="6" name="Picture 5">
+            <a:extLst>
+              <a:ext uri="{FF2B5EF4-FFF2-40B4-BE49-F238E27FC236}">
+                <a16:creationId xmlns:a16="http://schemas.microsoft.com/office/drawing/2014/main" id="{4298C1F8-8A4C-4D1C-9D78-A17D7343E771}"/>
+              </a:ext>
+            </a:extLst>
+          </p:cNvPr>
+          <p:cNvPicPr>
+            <a:picLocks noChangeAspect="1"/>
+          </p:cNvPicPr>
+          <p:nvPr/>
+        </p:nvPicPr>
+        <p:blipFill>
+          <a:blip r:embed="rId3"/>
+          <a:stretch>
+            <a:fillRect/>
+          </a:stretch>
+        </p:blipFill>
+        <p:spPr>
+          <a:xfrm>
+            <a:off x="3610318" y="852880"/>
+            <a:ext cx="2209524" cy="619048"/>
+          </a:xfrm>
+          <a:prstGeom prst="rect">
+            <a:avLst/>
+          </a:prstGeom>
+        </p:spPr>
+      </p:pic>
+      <p:sp>
+        <p:nvSpPr>
+          <p:cNvPr id="8" name="Rectangle 7">
+            <a:extLst>
+              <a:ext uri="{FF2B5EF4-FFF2-40B4-BE49-F238E27FC236}">
+                <a16:creationId xmlns:a16="http://schemas.microsoft.com/office/drawing/2014/main" id="{FD4A57F6-21E4-4729-B876-8BF9D33F7ED9}"/>
+              </a:ext>
+            </a:extLst>
+          </p:cNvPr>
+          <p:cNvSpPr/>
+          <p:nvPr/>
+        </p:nvSpPr>
+        <p:spPr>
+          <a:xfrm>
+            <a:off x="1152916" y="4608514"/>
+            <a:ext cx="7124330" cy="1815882"/>
+          </a:xfrm>
+          <a:prstGeom prst="rect">
+            <a:avLst/>
+          </a:prstGeom>
+        </p:spPr>
+        <p:txBody>
+          <a:bodyPr wrap="square">
+            <a:spAutoFit/>
+          </a:bodyPr>
+          <a:lstStyle/>
+          <a:p>
+            <a:pPr algn="ctr"/>
+            <a:r>
+              <a:rPr lang="en-US" sz="1600" dirty="0">
+                <a:solidFill>
+                  <a:srgbClr val="24292E"/>
+                </a:solidFill>
+                <a:latin typeface="-apple-system"/>
+              </a:rPr>
+              <a:t>"Wattpad takes everything you love about storytelling, and turns it into a social, on-the-go experience. The result is a one-of-a-kind adventure in creation and discovery of stories. Today, the global Wattpad community is made up of more than 65 million people. We’re proudly based in Toronto, Canada, but Wattpad stories transcend borders, interests, and language.“</a:t>
+            </a:r>
+          </a:p>
+          <a:p>
+            <a:pPr algn="ctr"/>
+            <a:endParaRPr lang="en-US" sz="1600" dirty="0">
+              <a:solidFill>
+                <a:srgbClr val="24292E"/>
+              </a:solidFill>
+              <a:latin typeface="-apple-system"/>
+            </a:endParaRPr>
+          </a:p>
+          <a:p>
+            <a:pPr algn="ctr"/>
+            <a:r>
+              <a:rPr lang="en-US" sz="1600" i="1" dirty="0">
+                <a:solidFill>
+                  <a:srgbClr val="24292E"/>
+                </a:solidFill>
+                <a:latin typeface="-apple-system"/>
+                <a:hlinkClick r:id="rId4"/>
+              </a:rPr>
+              <a:t>https://www.wattpad.com/about/</a:t>
+            </a:r>
+            <a:r>
+              <a:rPr lang="en-US" sz="1600" i="1" dirty="0">
+                <a:solidFill>
+                  <a:srgbClr val="24292E"/>
+                </a:solidFill>
+                <a:latin typeface="-apple-system"/>
+              </a:rPr>
+              <a:t> </a:t>
+            </a:r>
+          </a:p>
+        </p:txBody>
+      </p:sp>
+    </p:spTree>
+    <p:extLst>
+      <p:ext uri="{BB962C8B-B14F-4D97-AF65-F5344CB8AC3E}">
+        <p14:creationId xmlns:p14="http://schemas.microsoft.com/office/powerpoint/2010/main" val="2495291481"/>
+      </p:ext>
+    </p:extLst>
+  </p:cSld>
+  <p:clrMapOvr>
+    <a:masterClrMapping/>
+  </p:clrMapOvr>
+</p:sld>
+</file>
+
+<file path=ppt/slides/slide3.xml><?xml version="1.0" encoding="utf-8"?>
+<p:sld xmlns:a="http://schemas.openxmlformats.org/drawingml/2006/main" xmlns:r="http://schemas.openxmlformats.org/officeDocument/2006/relationships" xmlns:p="http://schemas.openxmlformats.org/presentationml/2006/main">
+  <p:cSld>
+    <p:spTree>
+      <p:nvGrpSpPr>
+        <p:cNvPr id="1" name=""/>
+        <p:cNvGrpSpPr/>
+        <p:nvPr/>
+      </p:nvGrpSpPr>
+      <p:grpSpPr>
+        <a:xfrm>
+          <a:off x="0" y="0"/>
+          <a:ext cx="0" cy="0"/>
+          <a:chOff x="0" y="0"/>
+          <a:chExt cx="0" cy="0"/>
+        </a:xfrm>
+      </p:grpSpPr>
+      <p:sp>
+        <p:nvSpPr>
           <p:cNvPr id="2" name="Title 1">
             <a:extLst>
               <a:ext uri="{FF2B5EF4-FFF2-40B4-BE49-F238E27FC236}">
@@ -19777,7 +20103,7 @@
         </p:nvSpPr>
         <p:spPr/>
         <p:txBody>
-          <a:bodyPr/>
+          <a:bodyPr anchor="ctr"/>
           <a:lstStyle/>
           <a:p>
             <a:r>
@@ -19838,7 +20164,7 @@
           <a:p>
             <a:fld id="{64D12EC4-2D04-0A4F-A74B-758ED03DD9F6}" type="slidenum">
               <a:rPr lang="en-US" smtClean="0"/>
-              <a:t>2</a:t>
+              <a:t>3</a:t>
             </a:fld>
             <a:endParaRPr lang="en-US"/>
           </a:p>
@@ -19885,7 +20211,7 @@
 </p:sld>
 </file>
 
-<file path=ppt/slides/slide3.xml><?xml version="1.0" encoding="utf-8"?>
+<file path=ppt/slides/slide4.xml><?xml version="1.0" encoding="utf-8"?>
 <p:sld xmlns:a="http://schemas.openxmlformats.org/drawingml/2006/main" xmlns:r="http://schemas.openxmlformats.org/officeDocument/2006/relationships" xmlns:p="http://schemas.openxmlformats.org/presentationml/2006/main">
   <p:cSld>
     <p:spTree>
@@ -19920,7 +20246,7 @@
         </p:nvSpPr>
         <p:spPr/>
         <p:txBody>
-          <a:bodyPr/>
+          <a:bodyPr anchor="t"/>
           <a:lstStyle/>
           <a:p>
             <a:r>
@@ -19945,14 +20271,14 @@
           <p:nvPr>
             <p:extLst>
               <p:ext uri="{D42A27DB-BD31-4B8C-83A1-F6EECF244321}">
-                <p14:modId xmlns:p14="http://schemas.microsoft.com/office/powerpoint/2010/main" val="1027714053"/>
+                <p14:modId xmlns:p14="http://schemas.microsoft.com/office/powerpoint/2010/main" val="1900391432"/>
               </p:ext>
             </p:extLst>
           </p:nvPr>
         </p:nvGraphicFramePr>
         <p:xfrm>
-          <a:off x="781235" y="1607126"/>
-          <a:ext cx="7625918" cy="3550920"/>
+          <a:off x="648729" y="1202818"/>
+          <a:ext cx="7625918" cy="4439920"/>
         </p:xfrm>
         <a:graphic>
           <a:graphicData uri="http://schemas.openxmlformats.org/drawingml/2006/table">
@@ -20017,7 +20343,40 @@
                     <a:p>
                       <a:r>
                         <a:rPr lang="en-US" sz="1400" dirty="0"/>
-                        <a:t>What types of stories are popular?</a:t>
+                        <a:t>What is the average popularity by read count, vote count, comment count?</a:t>
+                      </a:r>
+                    </a:p>
+                  </a:txBody>
+                  <a:tcPr/>
+                </a:tc>
+                <a:tc>
+                  <a:txBody>
+                    <a:bodyPr/>
+                    <a:lstStyle/>
+                    <a:p>
+                      <a:r>
+                        <a:rPr lang="en-US" sz="1400" dirty="0"/>
+                        <a:t>Story ID, Read Count, Vote Count, Comment Count</a:t>
+                      </a:r>
+                    </a:p>
+                  </a:txBody>
+                  <a:tcPr/>
+                </a:tc>
+                <a:extLst>
+                  <a:ext uri="{0D108BD9-81ED-4DB2-BD59-A6C34878D82A}">
+                    <a16:rowId xmlns:a16="http://schemas.microsoft.com/office/drawing/2014/main" val="3548622607"/>
+                  </a:ext>
+                </a:extLst>
+              </a:tr>
+              <a:tr h="370840">
+                <a:tc>
+                  <a:txBody>
+                    <a:bodyPr/>
+                    <a:lstStyle/>
+                    <a:p>
+                      <a:r>
+                        <a:rPr lang="en-US" sz="1400" dirty="0"/>
+                        <a:t>What are the most popular categories?</a:t>
                       </a:r>
                     </a:p>
                   </a:txBody>
@@ -20240,6 +20599,39 @@
                   </a:ext>
                 </a:extLst>
               </a:tr>
+              <a:tr h="370840">
+                <a:tc>
+                  <a:txBody>
+                    <a:bodyPr/>
+                    <a:lstStyle/>
+                    <a:p>
+                      <a:r>
+                        <a:rPr lang="en-US" sz="1400" dirty="0"/>
+                        <a:t>What are the most popular languages?</a:t>
+                      </a:r>
+                    </a:p>
+                  </a:txBody>
+                  <a:tcPr/>
+                </a:tc>
+                <a:tc>
+                  <a:txBody>
+                    <a:bodyPr/>
+                    <a:lstStyle/>
+                    <a:p>
+                      <a:r>
+                        <a:rPr lang="en-US" sz="1400" dirty="0"/>
+                        <a:t>Story ID, language</a:t>
+                      </a:r>
+                    </a:p>
+                  </a:txBody>
+                  <a:tcPr/>
+                </a:tc>
+                <a:extLst>
+                  <a:ext uri="{0D108BD9-81ED-4DB2-BD59-A6C34878D82A}">
+                    <a16:rowId xmlns:a16="http://schemas.microsoft.com/office/drawing/2014/main" val="894899982"/>
+                  </a:ext>
+                </a:extLst>
+              </a:tr>
             </a:tbl>
           </a:graphicData>
         </a:graphic>
@@ -20336,7 +20728,7 @@
           <a:p>
             <a:fld id="{64D12EC4-2D04-0A4F-A74B-758ED03DD9F6}" type="slidenum">
               <a:rPr lang="en-US" smtClean="0"/>
-              <a:t>3</a:t>
+              <a:t>4</a:t>
             </a:fld>
             <a:endParaRPr lang="en-US"/>
           </a:p>
@@ -20355,7 +20747,7 @@
 </p:sld>
 </file>
 
-<file path=ppt/slides/slide4.xml><?xml version="1.0" encoding="utf-8"?>
+<file path=ppt/slides/slide5.xml><?xml version="1.0" encoding="utf-8"?>
 <p:sld xmlns:a="http://schemas.openxmlformats.org/drawingml/2006/main" xmlns:r="http://schemas.openxmlformats.org/officeDocument/2006/relationships" xmlns:p="http://schemas.openxmlformats.org/presentationml/2006/main">
   <p:cSld>
     <p:spTree>
@@ -20390,7 +20782,7 @@
         </p:nvSpPr>
         <p:spPr/>
         <p:txBody>
-          <a:bodyPr/>
+          <a:bodyPr anchor="t"/>
           <a:lstStyle/>
           <a:p>
             <a:r>
@@ -20416,13 +20808,13 @@
             <p:ph idx="1"/>
             <p:extLst>
               <p:ext uri="{D42A27DB-BD31-4B8C-83A1-F6EECF244321}">
-                <p14:modId xmlns:p14="http://schemas.microsoft.com/office/powerpoint/2010/main" val="851709475"/>
+                <p14:modId xmlns:p14="http://schemas.microsoft.com/office/powerpoint/2010/main" val="1075004781"/>
               </p:ext>
             </p:extLst>
           </p:nvPr>
         </p:nvGraphicFramePr>
         <p:xfrm>
-          <a:off x="1633491" y="5300370"/>
+          <a:off x="1500326" y="5291564"/>
           <a:ext cx="6461279" cy="1076368"/>
         </p:xfrm>
         <a:graphic>
@@ -20545,13 +20937,13 @@
           <p:nvPr>
             <p:extLst>
               <p:ext uri="{D42A27DB-BD31-4B8C-83A1-F6EECF244321}">
-                <p14:modId xmlns:p14="http://schemas.microsoft.com/office/powerpoint/2010/main" val="3053381956"/>
+                <p14:modId xmlns:p14="http://schemas.microsoft.com/office/powerpoint/2010/main" val="907135623"/>
               </p:ext>
             </p:extLst>
           </p:nvPr>
         </p:nvGraphicFramePr>
         <p:xfrm>
-          <a:off x="1909947" y="1699296"/>
+          <a:off x="1909947" y="1530620"/>
           <a:ext cx="5245524" cy="3387607"/>
         </p:xfrm>
         <a:graphic>
@@ -20611,7 +21003,7 @@
           <a:p>
             <a:fld id="{64D12EC4-2D04-0A4F-A74B-758ED03DD9F6}" type="slidenum">
               <a:rPr lang="en-US" smtClean="0"/>
-              <a:t>4</a:t>
+              <a:t>5</a:t>
             </a:fld>
             <a:endParaRPr lang="en-US"/>
           </a:p>
@@ -20630,7 +21022,7 @@
 </p:sld>
 </file>
 
-<file path=ppt/slides/slide5.xml><?xml version="1.0" encoding="utf-8"?>
+<file path=ppt/slides/slide6.xml><?xml version="1.0" encoding="utf-8"?>
 <p:sld xmlns:a="http://schemas.openxmlformats.org/drawingml/2006/main" xmlns:r="http://schemas.openxmlformats.org/officeDocument/2006/relationships" xmlns:p="http://schemas.openxmlformats.org/presentationml/2006/main">
   <p:cSld>
     <p:spTree>
@@ -20665,7 +21057,7 @@
         </p:nvSpPr>
         <p:spPr/>
         <p:txBody>
-          <a:bodyPr/>
+          <a:bodyPr anchor="t"/>
           <a:lstStyle/>
           <a:p>
             <a:r>
@@ -20952,7 +21344,7 @@
           <p:nvPr>
             <p:extLst>
               <p:ext uri="{D42A27DB-BD31-4B8C-83A1-F6EECF244321}">
-                <p14:modId xmlns:p14="http://schemas.microsoft.com/office/powerpoint/2010/main" val="3092084478"/>
+                <p14:modId xmlns:p14="http://schemas.microsoft.com/office/powerpoint/2010/main" val="747614015"/>
               </p:ext>
             </p:extLst>
           </p:nvPr>
@@ -21018,7 +21410,7 @@
           <a:p>
             <a:fld id="{64D12EC4-2D04-0A4F-A74B-758ED03DD9F6}" type="slidenum">
               <a:rPr lang="en-US" smtClean="0"/>
-              <a:t>5</a:t>
+              <a:t>6</a:t>
             </a:fld>
             <a:endParaRPr lang="en-US"/>
           </a:p>
@@ -21037,7 +21429,7 @@
 </p:sld>
 </file>
 
-<file path=ppt/slides/slide6.xml><?xml version="1.0" encoding="utf-8"?>
+<file path=ppt/slides/slide7.xml><?xml version="1.0" encoding="utf-8"?>
 <p:sld xmlns:a="http://schemas.openxmlformats.org/drawingml/2006/main" xmlns:r="http://schemas.openxmlformats.org/officeDocument/2006/relationships" xmlns:p="http://schemas.openxmlformats.org/presentationml/2006/main">
   <p:cSld>
     <p:spTree>
@@ -21072,7 +21464,7 @@
         </p:nvSpPr>
         <p:spPr/>
         <p:txBody>
-          <a:bodyPr/>
+          <a:bodyPr anchor="t"/>
           <a:lstStyle/>
           <a:p>
             <a:r>
@@ -21082,69 +21474,6 @@
           </a:p>
         </p:txBody>
       </p:sp>
-      <p:pic>
-        <p:nvPicPr>
-          <p:cNvPr id="4" name="Picture 3">
-            <a:extLst>
-              <a:ext uri="{FF2B5EF4-FFF2-40B4-BE49-F238E27FC236}">
-                <a16:creationId xmlns:a16="http://schemas.microsoft.com/office/drawing/2014/main" id="{6C95034A-00C4-492D-A61F-41C5FBBA9C28}"/>
-              </a:ext>
-            </a:extLst>
-          </p:cNvPr>
-          <p:cNvPicPr>
-            <a:picLocks noChangeAspect="1"/>
-          </p:cNvPicPr>
-          <p:nvPr/>
-        </p:nvPicPr>
-        <p:blipFill>
-          <a:blip r:embed="rId2"/>
-          <a:stretch>
-            <a:fillRect/>
-          </a:stretch>
-        </p:blipFill>
-        <p:spPr>
-          <a:xfrm>
-            <a:off x="759249" y="1638294"/>
-            <a:ext cx="4084268" cy="3267415"/>
-          </a:xfrm>
-          <a:prstGeom prst="rect">
-            <a:avLst/>
-          </a:prstGeom>
-          <a:ln>
-            <a:solidFill>
-              <a:schemeClr val="accent1"/>
-            </a:solidFill>
-          </a:ln>
-        </p:spPr>
-      </p:pic>
-      <p:graphicFrame>
-        <p:nvGraphicFramePr>
-          <p:cNvPr id="12" name="Diagram 11">
-            <a:extLst>
-              <a:ext uri="{FF2B5EF4-FFF2-40B4-BE49-F238E27FC236}">
-                <a16:creationId xmlns:a16="http://schemas.microsoft.com/office/drawing/2014/main" id="{E712B085-ED4C-4365-BCA8-065149D64E5F}"/>
-              </a:ext>
-            </a:extLst>
-          </p:cNvPr>
-          <p:cNvGraphicFramePr/>
-          <p:nvPr>
-            <p:extLst>
-              <p:ext uri="{D42A27DB-BD31-4B8C-83A1-F6EECF244321}">
-                <p14:modId xmlns:p14="http://schemas.microsoft.com/office/powerpoint/2010/main" val="1990691645"/>
-              </p:ext>
-            </p:extLst>
-          </p:nvPr>
-        </p:nvGraphicFramePr>
-        <p:xfrm>
-          <a:off x="4843517" y="2285355"/>
-          <a:ext cx="4042299" cy="2366544"/>
-        </p:xfrm>
-        <a:graphic>
-          <a:graphicData uri="http://schemas.openxmlformats.org/drawingml/2006/diagram">
-            <dgm:relIds xmlns:dgm="http://schemas.openxmlformats.org/drawingml/2006/diagram" xmlns:r="http://schemas.openxmlformats.org/officeDocument/2006/relationships" r:dm="rId3" r:lo="rId4" r:qs="rId5" r:cs="rId6"/>
-          </a:graphicData>
-        </a:graphic>
-      </p:graphicFrame>
       <p:sp>
         <p:nvSpPr>
           <p:cNvPr id="13" name="TextBox 12">
@@ -21159,8 +21488,8 @@
         </p:nvSpPr>
         <p:spPr>
           <a:xfrm>
-            <a:off x="1319082" y="5264459"/>
-            <a:ext cx="7048870" cy="646331"/>
+            <a:off x="1395394" y="5008378"/>
+            <a:ext cx="6859058" cy="923330"/>
           </a:xfrm>
           <a:prstGeom prst="rect">
             <a:avLst/>
@@ -21175,14 +21504,31 @@
           </a:bodyPr>
           <a:lstStyle/>
           <a:p>
-            <a:pPr algn="ctr"/>
+            <a:pPr marL="285750" indent="-285750">
+              <a:buFont typeface="Arial" panose="020B0604020202020204" pitchFamily="34" charset="0"/>
+              <a:buChar char="•"/>
+            </a:pPr>
             <a:r>
               <a:rPr lang="en-US" dirty="0">
                 <a:solidFill>
                   <a:schemeClr val="bg1"/>
                 </a:solidFill>
               </a:rPr>
-              <a:t>Stories posted annually generally have increased since 2011, with the exception of decrease in growth during 2016.</a:t>
+              <a:t>Number of stories created increase annually with 2018 at the highest</a:t>
+            </a:r>
+          </a:p>
+          <a:p>
+            <a:pPr marL="285750" indent="-285750">
+              <a:buFont typeface="Arial" panose="020B0604020202020204" pitchFamily="34" charset="0"/>
+              <a:buChar char="•"/>
+            </a:pPr>
+            <a:r>
+              <a:rPr lang="en-US" dirty="0">
+                <a:solidFill>
+                  <a:schemeClr val="bg1"/>
+                </a:solidFill>
+              </a:rPr>
+              <a:t>Indicates that the data set analyzed has pulled only the most recent records</a:t>
             </a:r>
           </a:p>
         </p:txBody>
@@ -21238,183 +21584,79 @@
           <a:p>
             <a:fld id="{64D12EC4-2D04-0A4F-A74B-758ED03DD9F6}" type="slidenum">
               <a:rPr lang="en-US" smtClean="0"/>
-              <a:t>6</a:t>
+              <a:t>7</a:t>
             </a:fld>
-            <a:endParaRPr lang="en-US"/>
+            <a:endParaRPr lang="en-US" dirty="0"/>
           </a:p>
         </p:txBody>
       </p:sp>
       <p:graphicFrame>
         <p:nvGraphicFramePr>
-          <p:cNvPr id="6" name="Table 5">
+          <p:cNvPr id="8" name="Diagram 7">
             <a:extLst>
               <a:ext uri="{FF2B5EF4-FFF2-40B4-BE49-F238E27FC236}">
-                <a16:creationId xmlns:a16="http://schemas.microsoft.com/office/drawing/2014/main" id="{8082210D-87F4-4121-9C76-73A145306157}"/>
+                <a16:creationId xmlns:a16="http://schemas.microsoft.com/office/drawing/2014/main" id="{3BDE02B9-A981-46B2-A230-9666D301E95C}"/>
               </a:ext>
             </a:extLst>
           </p:cNvPr>
-          <p:cNvGraphicFramePr>
-            <a:graphicFrameLocks noGrp="1"/>
-          </p:cNvGraphicFramePr>
+          <p:cNvGraphicFramePr/>
           <p:nvPr>
             <p:extLst>
               <p:ext uri="{D42A27DB-BD31-4B8C-83A1-F6EECF244321}">
-                <p14:modId xmlns:p14="http://schemas.microsoft.com/office/powerpoint/2010/main" val="1564959225"/>
+                <p14:modId xmlns:p14="http://schemas.microsoft.com/office/powerpoint/2010/main" val="1225164936"/>
               </p:ext>
             </p:extLst>
           </p:nvPr>
         </p:nvGraphicFramePr>
         <p:xfrm>
-          <a:off x="4601222" y="521616"/>
-          <a:ext cx="3971278" cy="1483360"/>
+          <a:off x="-130088" y="1963062"/>
+          <a:ext cx="4848479" cy="2047536"/>
         </p:xfrm>
         <a:graphic>
-          <a:graphicData uri="http://schemas.openxmlformats.org/drawingml/2006/table">
-            <a:tbl>
-              <a:tblPr bandRow="1">
-                <a:tableStyleId>{5C22544A-7EE6-4342-B048-85BDC9FD1C3A}</a:tableStyleId>
-              </a:tblPr>
-              <a:tblGrid>
-                <a:gridCol w="956191">
-                  <a:extLst>
-                    <a:ext uri="{9D8B030D-6E8A-4147-A177-3AD203B41FA5}">
-                      <a16:colId xmlns:a16="http://schemas.microsoft.com/office/drawing/2014/main" val="484288319"/>
-                    </a:ext>
-                  </a:extLst>
-                </a:gridCol>
-                <a:gridCol w="3015087">
-                  <a:extLst>
-                    <a:ext uri="{9D8B030D-6E8A-4147-A177-3AD203B41FA5}">
-                      <a16:colId xmlns:a16="http://schemas.microsoft.com/office/drawing/2014/main" val="1693164808"/>
-                    </a:ext>
-                  </a:extLst>
-                </a:gridCol>
-              </a:tblGrid>
-              <a:tr h="370840">
-                <a:tc>
-                  <a:txBody>
-                    <a:bodyPr/>
-                    <a:lstStyle/>
-                    <a:p>
-                      <a:r>
-                        <a:rPr lang="en-US" dirty="0"/>
-                        <a:t>244</a:t>
-                      </a:r>
-                    </a:p>
-                  </a:txBody>
-                  <a:tcPr/>
-                </a:tc>
-                <a:tc>
-                  <a:txBody>
-                    <a:bodyPr/>
-                    <a:lstStyle/>
-                    <a:p>
-                      <a:endParaRPr lang="en-US" dirty="0"/>
-                    </a:p>
-                  </a:txBody>
-                  <a:tcPr/>
-                </a:tc>
-                <a:extLst>
-                  <a:ext uri="{0D108BD9-81ED-4DB2-BD59-A6C34878D82A}">
-                    <a16:rowId xmlns:a16="http://schemas.microsoft.com/office/drawing/2014/main" val="2905951812"/>
-                  </a:ext>
-                </a:extLst>
-              </a:tr>
-              <a:tr h="370840">
-                <a:tc>
-                  <a:txBody>
-                    <a:bodyPr/>
-                    <a:lstStyle/>
-                    <a:p>
-                      <a:r>
-                        <a:rPr lang="en-US" dirty="0"/>
-                        <a:t>12</a:t>
-                      </a:r>
-                    </a:p>
-                  </a:txBody>
-                  <a:tcPr/>
-                </a:tc>
-                <a:tc>
-                  <a:txBody>
-                    <a:bodyPr/>
-                    <a:lstStyle/>
-                    <a:p>
-                      <a:endParaRPr lang="en-US"/>
-                    </a:p>
-                  </a:txBody>
-                  <a:tcPr/>
-                </a:tc>
-                <a:extLst>
-                  <a:ext uri="{0D108BD9-81ED-4DB2-BD59-A6C34878D82A}">
-                    <a16:rowId xmlns:a16="http://schemas.microsoft.com/office/drawing/2014/main" val="3162044423"/>
-                  </a:ext>
-                </a:extLst>
-              </a:tr>
-              <a:tr h="370840">
-                <a:tc>
-                  <a:txBody>
-                    <a:bodyPr/>
-                    <a:lstStyle/>
-                    <a:p>
-                      <a:r>
-                        <a:rPr lang="en-US" dirty="0"/>
-                        <a:t>75</a:t>
-                      </a:r>
-                    </a:p>
-                  </a:txBody>
-                  <a:tcPr/>
-                </a:tc>
-                <a:tc>
-                  <a:txBody>
-                    <a:bodyPr/>
-                    <a:lstStyle/>
-                    <a:p>
-                      <a:endParaRPr lang="en-US"/>
-                    </a:p>
-                  </a:txBody>
-                  <a:tcPr/>
-                </a:tc>
-                <a:extLst>
-                  <a:ext uri="{0D108BD9-81ED-4DB2-BD59-A6C34878D82A}">
-                    <a16:rowId xmlns:a16="http://schemas.microsoft.com/office/drawing/2014/main" val="2053007058"/>
-                  </a:ext>
-                </a:extLst>
-              </a:tr>
-              <a:tr h="370840">
-                <a:tc>
-                  <a:txBody>
-                    <a:bodyPr/>
-                    <a:lstStyle/>
-                    <a:p>
-                      <a:endParaRPr lang="en-US"/>
-                    </a:p>
-                  </a:txBody>
-                  <a:tcPr/>
-                </a:tc>
-                <a:tc>
-                  <a:txBody>
-                    <a:bodyPr/>
-                    <a:lstStyle/>
-                    <a:p>
-                      <a:endParaRPr lang="en-US" dirty="0"/>
-                    </a:p>
-                  </a:txBody>
-                  <a:tcPr/>
-                </a:tc>
-                <a:extLst>
-                  <a:ext uri="{0D108BD9-81ED-4DB2-BD59-A6C34878D82A}">
-                    <a16:rowId xmlns:a16="http://schemas.microsoft.com/office/drawing/2014/main" val="3138361017"/>
-                  </a:ext>
-                </a:extLst>
-              </a:tr>
-            </a:tbl>
+          <a:graphicData uri="http://schemas.openxmlformats.org/drawingml/2006/diagram">
+            <dgm:relIds xmlns:dgm="http://schemas.openxmlformats.org/drawingml/2006/diagram" xmlns:r="http://schemas.openxmlformats.org/officeDocument/2006/relationships" r:dm="rId2" r:lo="rId3" r:qs="rId4" r:cs="rId5"/>
           </a:graphicData>
         </a:graphic>
       </p:graphicFrame>
+      <p:pic>
+        <p:nvPicPr>
+          <p:cNvPr id="10" name="Picture 9">
+            <a:extLst>
+              <a:ext uri="{FF2B5EF4-FFF2-40B4-BE49-F238E27FC236}">
+                <a16:creationId xmlns:a16="http://schemas.microsoft.com/office/drawing/2014/main" id="{98947516-0F8C-435F-BE13-D41F622E070A}"/>
+              </a:ext>
+            </a:extLst>
+          </p:cNvPr>
+          <p:cNvPicPr>
+            <a:picLocks noChangeAspect="1"/>
+          </p:cNvPicPr>
+          <p:nvPr/>
+        </p:nvPicPr>
+        <p:blipFill>
+          <a:blip r:embed="rId7"/>
+          <a:stretch>
+            <a:fillRect/>
+          </a:stretch>
+        </p:blipFill>
+        <p:spPr>
+          <a:xfrm>
+            <a:off x="4532709" y="1328632"/>
+            <a:ext cx="4068921" cy="3255137"/>
+          </a:xfrm>
+          <a:prstGeom prst="rect">
+            <a:avLst/>
+          </a:prstGeom>
+          <a:ln>
+            <a:solidFill>
+              <a:schemeClr val="accent1"/>
+            </a:solidFill>
+          </a:ln>
+        </p:spPr>
+      </p:pic>
     </p:spTree>
     <p:extLst>
       <p:ext uri="{BB962C8B-B14F-4D97-AF65-F5344CB8AC3E}">
-        <p14:creationId xmlns:p14="http://schemas.microsoft.com/office/powerpoint/2010/main" val="2616930399"/>
+        <p14:creationId xmlns:p14="http://schemas.microsoft.com/office/powerpoint/2010/main" val="423649454"/>
       </p:ext>
     </p:extLst>
   </p:cSld>
@@ -21424,7 +21666,7 @@
 </p:sld>
 </file>
 
-<file path=ppt/slides/slide7.xml><?xml version="1.0" encoding="utf-8"?>
+<file path=ppt/slides/slide8.xml><?xml version="1.0" encoding="utf-8"?>
 <p:sld xmlns:a="http://schemas.openxmlformats.org/drawingml/2006/main" xmlns:r="http://schemas.openxmlformats.org/officeDocument/2006/relationships" xmlns:p="http://schemas.openxmlformats.org/presentationml/2006/main">
   <p:cSld>
     <p:spTree>
@@ -21459,12 +21701,12 @@
         </p:nvSpPr>
         <p:spPr/>
         <p:txBody>
-          <a:bodyPr/>
+          <a:bodyPr anchor="t"/>
           <a:lstStyle/>
           <a:p>
             <a:r>
               <a:rPr lang="en-US" dirty="0"/>
-              <a:t>Story Tag Popularity</a:t>
+              <a:t>Story Tag</a:t>
             </a:r>
           </a:p>
         </p:txBody>
@@ -21491,43 +21733,8 @@
         </p:blipFill>
         <p:spPr>
           <a:xfrm>
-            <a:off x="421436" y="1828801"/>
+            <a:off x="306492" y="1451642"/>
             <a:ext cx="4454715" cy="3643744"/>
-          </a:xfrm>
-          <a:prstGeom prst="rect">
-            <a:avLst/>
-          </a:prstGeom>
-          <a:ln>
-            <a:solidFill>
-              <a:schemeClr val="accent1"/>
-            </a:solidFill>
-          </a:ln>
-        </p:spPr>
-      </p:pic>
-      <p:pic>
-        <p:nvPicPr>
-          <p:cNvPr id="6" name="Picture 5">
-            <a:extLst>
-              <a:ext uri="{FF2B5EF4-FFF2-40B4-BE49-F238E27FC236}">
-                <a16:creationId xmlns:a16="http://schemas.microsoft.com/office/drawing/2014/main" id="{92CF471D-A2FB-48FE-B4B0-F3DA156ED066}"/>
-              </a:ext>
-            </a:extLst>
-          </p:cNvPr>
-          <p:cNvPicPr>
-            <a:picLocks noChangeAspect="1"/>
-          </p:cNvPicPr>
-          <p:nvPr/>
-        </p:nvPicPr>
-        <p:blipFill>
-          <a:blip r:embed="rId4"/>
-          <a:stretch>
-            <a:fillRect/>
-          </a:stretch>
-        </p:blipFill>
-        <p:spPr>
-          <a:xfrm>
-            <a:off x="4947634" y="1828801"/>
-            <a:ext cx="3696349" cy="3643744"/>
           </a:xfrm>
           <a:prstGeom prst="rect">
             <a:avLst/>
@@ -21553,8 +21760,8 @@
         </p:nvSpPr>
         <p:spPr>
           <a:xfrm>
-            <a:off x="1882065" y="5672831"/>
-            <a:ext cx="5291091" cy="369332"/>
+            <a:off x="1202927" y="5244424"/>
+            <a:ext cx="7279688" cy="923330"/>
           </a:xfrm>
           <a:prstGeom prst="rect">
             <a:avLst/>
@@ -21569,13 +21776,25 @@
           </a:bodyPr>
           <a:lstStyle/>
           <a:p>
+            <a:pPr algn="ctr"/>
             <a:r>
               <a:rPr lang="en-US" dirty="0">
                 <a:solidFill>
                   <a:schemeClr val="bg1"/>
                 </a:solidFill>
               </a:rPr>
-              <a:t>Most popular tags are Romance, Love and Fanfiction</a:t>
+              <a:t>Wattpad writers and users like Love and Romance</a:t>
+            </a:r>
+          </a:p>
+          <a:p>
+            <a:pPr algn="ctr"/>
+            <a:r>
+              <a:rPr lang="en-US" dirty="0">
+                <a:solidFill>
+                  <a:schemeClr val="bg1"/>
+                </a:solidFill>
+              </a:rPr>
+              <a:t>(Love and romance are most applied tags, and tagged to stories with highest number of votes)</a:t>
             </a:r>
           </a:p>
         </p:txBody>
@@ -21608,35 +21827,41 @@
           </a:p>
         </p:txBody>
       </p:sp>
-      <p:sp>
-        <p:nvSpPr>
-          <p:cNvPr id="5" name="Slide Number Placeholder 4">
+      <p:pic>
+        <p:nvPicPr>
+          <p:cNvPr id="9" name="Picture 8">
             <a:extLst>
               <a:ext uri="{FF2B5EF4-FFF2-40B4-BE49-F238E27FC236}">
-                <a16:creationId xmlns:a16="http://schemas.microsoft.com/office/drawing/2014/main" id="{E4910F76-C505-4DFC-B391-70F7865B5C64}"/>
+                <a16:creationId xmlns:a16="http://schemas.microsoft.com/office/drawing/2014/main" id="{D78D307F-8429-482B-BFAB-80DE265EA38E}"/>
               </a:ext>
             </a:extLst>
           </p:cNvPr>
-          <p:cNvSpPr>
-            <a:spLocks noGrp="1"/>
-          </p:cNvSpPr>
-          <p:nvPr>
-            <p:ph type="sldNum" sz="quarter" idx="12"/>
-          </p:nvPr>
-        </p:nvSpPr>
-        <p:spPr/>
-        <p:txBody>
-          <a:bodyPr/>
-          <a:lstStyle/>
-          <a:p>
-            <a:fld id="{64D12EC4-2D04-0A4F-A74B-758ED03DD9F6}" type="slidenum">
-              <a:rPr lang="en-US" smtClean="0"/>
-              <a:t>7</a:t>
-            </a:fld>
-            <a:endParaRPr lang="en-US"/>
-          </a:p>
-        </p:txBody>
-      </p:sp>
+          <p:cNvPicPr>
+            <a:picLocks noChangeAspect="1"/>
+          </p:cNvPicPr>
+          <p:nvPr/>
+        </p:nvPicPr>
+        <p:blipFill>
+          <a:blip r:embed="rId4"/>
+          <a:stretch>
+            <a:fillRect/>
+          </a:stretch>
+        </p:blipFill>
+        <p:spPr>
+          <a:xfrm>
+            <a:off x="4762872" y="1451642"/>
+            <a:ext cx="3903270" cy="3646458"/>
+          </a:xfrm>
+          <a:prstGeom prst="rect">
+            <a:avLst/>
+          </a:prstGeom>
+          <a:ln>
+            <a:solidFill>
+              <a:schemeClr val="accent1"/>
+            </a:solidFill>
+          </a:ln>
+        </p:spPr>
+      </p:pic>
     </p:spTree>
     <p:extLst>
       <p:ext uri="{BB962C8B-B14F-4D97-AF65-F5344CB8AC3E}">
@@ -21650,7 +21875,7 @@
 </p:sld>
 </file>
 
-<file path=ppt/slides/slide8.xml><?xml version="1.0" encoding="utf-8"?>
+<file path=ppt/slides/slide9.xml><?xml version="1.0" encoding="utf-8"?>
 <p:sld xmlns:a="http://schemas.openxmlformats.org/drawingml/2006/main" xmlns:r="http://schemas.openxmlformats.org/officeDocument/2006/relationships" xmlns:p="http://schemas.openxmlformats.org/presentationml/2006/main">
   <p:cSld>
     <p:spTree>
@@ -21685,7 +21910,7 @@
         </p:nvSpPr>
         <p:spPr/>
         <p:txBody>
-          <a:bodyPr/>
+          <a:bodyPr anchor="t"/>
           <a:lstStyle/>
           <a:p>
             <a:r>
@@ -21795,6 +22020,10 @@
           </a:bodyPr>
           <a:lstStyle/>
           <a:p>
+            <a:pPr marL="285750" indent="-285750">
+              <a:buFont typeface="Arial" panose="020B0604020202020204" pitchFamily="34" charset="0"/>
+              <a:buChar char="•"/>
+            </a:pPr>
             <a:r>
               <a:rPr lang="en-US" dirty="0">
                 <a:solidFill>
@@ -21805,6 +22034,10 @@
             </a:r>
           </a:p>
           <a:p>
+            <a:pPr marL="285750" indent="-285750">
+              <a:buFont typeface="Arial" panose="020B0604020202020204" pitchFamily="34" charset="0"/>
+              <a:buChar char="•"/>
+            </a:pPr>
             <a:r>
               <a:rPr lang="en-US" dirty="0">
                 <a:solidFill>
@@ -21848,252 +22081,6 @@
     <p:extLst>
       <p:ext uri="{BB962C8B-B14F-4D97-AF65-F5344CB8AC3E}">
         <p14:creationId xmlns:p14="http://schemas.microsoft.com/office/powerpoint/2010/main" val="104536331"/>
-      </p:ext>
-    </p:extLst>
-  </p:cSld>
-  <p:clrMapOvr>
-    <a:masterClrMapping/>
-  </p:clrMapOvr>
-</p:sld>
-</file>
-
-<file path=ppt/slides/slide9.xml><?xml version="1.0" encoding="utf-8"?>
-<p:sld xmlns:a="http://schemas.openxmlformats.org/drawingml/2006/main" xmlns:r="http://schemas.openxmlformats.org/officeDocument/2006/relationships" xmlns:p="http://schemas.openxmlformats.org/presentationml/2006/main">
-  <p:cSld>
-    <p:spTree>
-      <p:nvGrpSpPr>
-        <p:cNvPr id="1" name=""/>
-        <p:cNvGrpSpPr/>
-        <p:nvPr/>
-      </p:nvGrpSpPr>
-      <p:grpSpPr>
-        <a:xfrm>
-          <a:off x="0" y="0"/>
-          <a:ext cx="0" cy="0"/>
-          <a:chOff x="0" y="0"/>
-          <a:chExt cx="0" cy="0"/>
-        </a:xfrm>
-      </p:grpSpPr>
-      <p:sp>
-        <p:nvSpPr>
-          <p:cNvPr id="2" name="Title 1">
-            <a:extLst>
-              <a:ext uri="{FF2B5EF4-FFF2-40B4-BE49-F238E27FC236}">
-                <a16:creationId xmlns:a16="http://schemas.microsoft.com/office/drawing/2014/main" id="{CBB67211-7222-4824-8A16-800B1CF60E4D}"/>
-              </a:ext>
-            </a:extLst>
-          </p:cNvPr>
-          <p:cNvSpPr>
-            <a:spLocks noGrp="1"/>
-          </p:cNvSpPr>
-          <p:nvPr>
-            <p:ph type="title"/>
-          </p:nvPr>
-        </p:nvSpPr>
-        <p:spPr/>
-        <p:txBody>
-          <a:bodyPr/>
-          <a:lstStyle/>
-          <a:p>
-            <a:r>
-              <a:rPr lang="en-US" dirty="0"/>
-              <a:t>Story Ratings</a:t>
-            </a:r>
-          </a:p>
-        </p:txBody>
-      </p:sp>
-      <p:pic>
-        <p:nvPicPr>
-          <p:cNvPr id="4" name="Picture 3">
-            <a:extLst>
-              <a:ext uri="{FF2B5EF4-FFF2-40B4-BE49-F238E27FC236}">
-                <a16:creationId xmlns:a16="http://schemas.microsoft.com/office/drawing/2014/main" id="{ADCE6F1D-8EF1-47CA-B2E2-93D680770915}"/>
-              </a:ext>
-            </a:extLst>
-          </p:cNvPr>
-          <p:cNvPicPr>
-            <a:picLocks noChangeAspect="1"/>
-          </p:cNvPicPr>
-          <p:nvPr/>
-        </p:nvPicPr>
-        <p:blipFill>
-          <a:blip r:embed="rId2"/>
-          <a:stretch>
-            <a:fillRect/>
-          </a:stretch>
-        </p:blipFill>
-        <p:spPr>
-          <a:xfrm>
-            <a:off x="796875" y="1990609"/>
-            <a:ext cx="3735834" cy="2988667"/>
-          </a:xfrm>
-          <a:prstGeom prst="rect">
-            <a:avLst/>
-          </a:prstGeom>
-          <a:ln>
-            <a:solidFill>
-              <a:schemeClr val="accent1"/>
-            </a:solidFill>
-          </a:ln>
-        </p:spPr>
-      </p:pic>
-      <p:pic>
-        <p:nvPicPr>
-          <p:cNvPr id="6" name="Picture 5">
-            <a:extLst>
-              <a:ext uri="{FF2B5EF4-FFF2-40B4-BE49-F238E27FC236}">
-                <a16:creationId xmlns:a16="http://schemas.microsoft.com/office/drawing/2014/main" id="{D07E9D19-2236-4D61-95F4-682FC0A63B01}"/>
-              </a:ext>
-            </a:extLst>
-          </p:cNvPr>
-          <p:cNvPicPr>
-            <a:picLocks noChangeAspect="1"/>
-          </p:cNvPicPr>
-          <p:nvPr/>
-        </p:nvPicPr>
-        <p:blipFill>
-          <a:blip r:embed="rId3"/>
-          <a:stretch>
-            <a:fillRect/>
-          </a:stretch>
-        </p:blipFill>
-        <p:spPr>
-          <a:xfrm>
-            <a:off x="4684687" y="1990609"/>
-            <a:ext cx="3735835" cy="2988668"/>
-          </a:xfrm>
-          <a:prstGeom prst="rect">
-            <a:avLst/>
-          </a:prstGeom>
-          <a:ln>
-            <a:solidFill>
-              <a:schemeClr val="accent1">
-                <a:hueOff val="0"/>
-                <a:satOff val="0"/>
-                <a:lumOff val="0"/>
-              </a:schemeClr>
-            </a:solidFill>
-          </a:ln>
-        </p:spPr>
-      </p:pic>
-      <p:sp>
-        <p:nvSpPr>
-          <p:cNvPr id="3" name="Footer Placeholder 2">
-            <a:extLst>
-              <a:ext uri="{FF2B5EF4-FFF2-40B4-BE49-F238E27FC236}">
-                <a16:creationId xmlns:a16="http://schemas.microsoft.com/office/drawing/2014/main" id="{A8DFC824-3571-469A-8F8B-60EAD2C772DB}"/>
-              </a:ext>
-            </a:extLst>
-          </p:cNvPr>
-          <p:cNvSpPr>
-            <a:spLocks noGrp="1"/>
-          </p:cNvSpPr>
-          <p:nvPr>
-            <p:ph type="ftr" sz="quarter" idx="11"/>
-          </p:nvPr>
-        </p:nvSpPr>
-        <p:spPr/>
-        <p:txBody>
-          <a:bodyPr/>
-          <a:lstStyle/>
-          <a:p>
-            <a:r>
-              <a:rPr lang="en-US"/>
-              <a:t>UTDataJan Tues/Thurs Team3</a:t>
-            </a:r>
-          </a:p>
-        </p:txBody>
-      </p:sp>
-      <p:sp>
-        <p:nvSpPr>
-          <p:cNvPr id="8" name="Slide Number Placeholder 7">
-            <a:extLst>
-              <a:ext uri="{FF2B5EF4-FFF2-40B4-BE49-F238E27FC236}">
-                <a16:creationId xmlns:a16="http://schemas.microsoft.com/office/drawing/2014/main" id="{A8F804FB-BE7D-4872-8227-E1DBE36AEF4A}"/>
-              </a:ext>
-            </a:extLst>
-          </p:cNvPr>
-          <p:cNvSpPr>
-            <a:spLocks noGrp="1"/>
-          </p:cNvSpPr>
-          <p:nvPr>
-            <p:ph type="sldNum" sz="quarter" idx="12"/>
-          </p:nvPr>
-        </p:nvSpPr>
-        <p:spPr/>
-        <p:txBody>
-          <a:bodyPr/>
-          <a:lstStyle/>
-          <a:p>
-            <a:fld id="{64D12EC4-2D04-0A4F-A74B-758ED03DD9F6}" type="slidenum">
-              <a:rPr lang="en-US" smtClean="0"/>
-              <a:t>9</a:t>
-            </a:fld>
-            <a:endParaRPr lang="en-US"/>
-          </a:p>
-        </p:txBody>
-      </p:sp>
-      <p:sp>
-        <p:nvSpPr>
-          <p:cNvPr id="7" name="TextBox 6">
-            <a:extLst>
-              <a:ext uri="{FF2B5EF4-FFF2-40B4-BE49-F238E27FC236}">
-                <a16:creationId xmlns:a16="http://schemas.microsoft.com/office/drawing/2014/main" id="{CDA3CEA4-0A37-4979-8625-AF47DFCE0CDD}"/>
-              </a:ext>
-            </a:extLst>
-          </p:cNvPr>
-          <p:cNvSpPr txBox="1"/>
-          <p:nvPr/>
-        </p:nvSpPr>
-        <p:spPr>
-          <a:xfrm>
-            <a:off x="1519797" y="5291092"/>
-            <a:ext cx="6329780" cy="646331"/>
-          </a:xfrm>
-          <a:prstGeom prst="rect">
-            <a:avLst/>
-          </a:prstGeom>
-          <a:solidFill>
-            <a:schemeClr val="accent1"/>
-          </a:solidFill>
-        </p:spPr>
-        <p:txBody>
-          <a:bodyPr wrap="square" rtlCol="0">
-            <a:spAutoFit/>
-          </a:bodyPr>
-          <a:lstStyle/>
-          <a:p>
-            <a:r>
-              <a:rPr lang="en-US" dirty="0">
-                <a:solidFill>
-                  <a:schemeClr val="bg1"/>
-                </a:solidFill>
-              </a:rPr>
-              <a:t>Popularity based on vote count appears to be a factor in </a:t>
-            </a:r>
-            <a:r>
-              <a:rPr lang="en-US" dirty="0" err="1">
-                <a:solidFill>
-                  <a:schemeClr val="bg1"/>
-                </a:solidFill>
-              </a:rPr>
-              <a:t>wattpad’s</a:t>
-            </a:r>
-            <a:r>
-              <a:rPr lang="en-US" dirty="0">
-                <a:solidFill>
-                  <a:schemeClr val="bg1"/>
-                </a:solidFill>
-              </a:rPr>
-              <a:t> assigned ratings, but is not the only factor </a:t>
-            </a:r>
-          </a:p>
-        </p:txBody>
-      </p:sp>
-    </p:spTree>
-    <p:extLst>
-      <p:ext uri="{BB962C8B-B14F-4D97-AF65-F5344CB8AC3E}">
-        <p14:creationId xmlns:p14="http://schemas.microsoft.com/office/powerpoint/2010/main" val="3415291721"/>
       </p:ext>
     </p:extLst>
   </p:cSld>

</xml_diff>